<commit_message>
Auto-updater Study material SAC
</commit_message>
<xml_diff>
--- a/day 2/SAC_Training Day 2.pptx
+++ b/day 2/SAC_Training Day 2.pptx
@@ -2883,6 +2883,206 @@
           <inkml:channelProperty channel="T" name="resolution" value="1" units="1/dev"/>
         </inkml:channelProperties>
       </inkml:inkSource>
+      <inkml:timestamp xml:id="ts0" timeString="2023-02-03T03:50:47.156"/>
+    </inkml:context>
+    <inkml:brush xml:id="br0">
+      <inkml:brushProperty name="width" value="0.05292" units="cm"/>
+      <inkml:brushProperty name="height" value="0.05292" units="cm"/>
+      <inkml:brushProperty name="color" value="#FF0000"/>
+    </inkml:brush>
+  </inkml:definitions>
+  <inkml:trace contextRef="#ctx0" brushRef="#br0">1799 3422 0,'0'0'0,"18"-18"31,-1 18-31,1-35 31,0 35-31,17 0 31,36 0-15,-36-18-16,88 18 16,-17-17-1,-35 17 1,35-18-1,-54 0 1,-34 18 0</inkml:trace>
+  <inkml:trace contextRef="#ctx0" brushRef="#br0" timeOffset="776.36">4586 3422 0,'0'0'0,"18"0"31,17-18-15,-17 18-16,105-17 16,-35 17-1,-35 0-15,35-18 16,-17 18 0</inkml:trace>
+  <inkml:trace contextRef="#ctx0" brushRef="#br0" timeOffset="15949.45">11836 7920 0,'0'0'0,"-18"-18"32,0 18-32,1 0 15,-1 0 1,-52 0 0,-1 0-1,-35 18 1,18-1-1,70 1-15,-52 0 16,-1 35 0,1 0 15,17 17-15,17-17-1,19 18 1,-1 34-1,18-16 1,35 16 0,-17-34-1,53 0 1,17-1 0,0-35-1,0-17 1,71-18-1,-18-35 1,18-18 15,-36-35-15,-52-1 0,-1-34-1,-70-18 1,-17 17-1,-36 54 1,-18-18 0,-17 35-1,35 17 1,0 1 0,18 35-1,0-17 1,-1 17-1,1 17 1</inkml:trace>
+  <inkml:trace contextRef="#ctx0" brushRef="#br0" timeOffset="17682.59">811 4410 0,'-17'0'0,"-1"0"31,0 0-31,-17 0 15,18 17-15,-36 1 16,0 35 0,17-18 15,19 0-31,-54 54 16,36-19-1,-18 36 1,35 35-1,18-17 1,36-54 0,17 18-1,88-17 17,-53-53-32,18-18 15,52-53 1,1-18-1,-35-17 17,-18-36-17,-71 36 1,-35-35 0,-18-1-1,-35 18 1,18 54-1,-18-37 1,-17 54 0,-1 0-1,0 35 1,36 0 0,-18 17-1,18 1 1,17 0-1</inkml:trace>
+  <inkml:trace contextRef="#ctx0" brushRef="#br0" timeOffset="19633.5">1323 5045 0,'0'-18'15,"0"36"-15,-18-36 16,36 18 15,0 0-31,-1 0 16,1 0-16,70 0 31,-35 0-31,70 0 16,-17 0-1,35 18 1,0 17-1,36 0 17,17 18-17,-53-18 1,53 36 0,0 0-1,-18 34 1,-17 1-1,-53-18 1,53 54 0,17-1-1,1 17 1,-54-34 0,36 17-1,-106-88 1,35 53-16,53 17 15,18-17 17,-53-35-17,35 17 1,0 0 0,0 0-1,-35-35 1,17 35-1,1 0 1,-1 1 0,1-19-1,-36-17 1,71 18 0,-1-1-1,19 1 16,17-1-15,-53-34 0,88 17-1,-17-1 1,-18-16 0,-88-1-1,52-17 1,1-1-1,0-17 1,-53 0 0,53 0-1,-1 0 1,19 0 0,-1 0-1,-52 0 1,52 18-1,0-18 17,1 18-17,-71-1 1,52 1 0,1 0-1,-36-1 1,-17-17-1,-17 0 1,16 18 0,19-18-1,-18 0 1,-18 0 0,18 17-1,-18-17 1,-18 0-1,1 18 17,-53-18-17,35 18 1,-36-1 0,36 1-1,0 0 1,35-1-1,0 1 1,-35-18 0,-35 0-1,-36 0 1</inkml:trace>
+  <inkml:trace contextRef="#ctx0" brushRef="#br0" timeOffset="20649.66">9772 8326 0,'0'0'0,"0"-18"63,0 36-32,18-18-15,17 70-1,-18-52 1,1 35-16,35 35 15,0-18 17,-35-34-32,17 52 15,0 35 1,-17 1 0,-1 17-1,-17-18 1,0-52-1,0 35 1,18-18 0,-18 0-1,18-17 1,-18-18 0,17 35-1,19-35 1,-1 17 15,18-52-15,35 17-1,0 1 1,0-36 0,-35 17-1,18-17 1,-1 18-1,-17-18 1,0 0 0,-35 17 15,-18 1-15,0 0-1</inkml:trace>
+  <inkml:trace contextRef="#ctx0" brushRef="#br0" timeOffset="22333.83">11624 9931 0,'0'0'0,"0"-18"15,0 0 1,0 1 0,-18 17-1,-35-18 1,1 18-1,16-18-15,-17 18 32,-52 18-17,16 17 1,-17 1 0,36-1-1,17 18 1,0 0-1,18 35 1,0 0 0,17-35-1,18 35 1,0 18 0,0-18-1,35 1 16,-17-19-15,17 36 0,-17 17-1,35-17 1,-18-35 0,0 17-1,18-17 1,0-19-1,0-16 1,18-1 0,-36-17-1,35-1 1,19 1 0,-19-18-1,18 0 16,0 0-15,1-18 0,17 1-1,-36-1 1,-17 0 0,0 1-1,0-19 1,-18 1-1,0-71 1,1-17 0,-1-1-1,-35 19 1,0 34 0,-35-35-1,17 18 1,-17-18 15,17 18-15,0 53-1,-17-36 1,-18 18 0,-17-17-1,52 34 1,-35-34-1,18 35 1,-18-18 0,35 35-1,-17-17 1,0-1 0,-1 19-1,19-1 16,-1 18-31,-17-18 32,0 1-17,17 17 1,18-18 0,-18 1-1,1-1 1,-19 0-1,19 18 1,-18 0 0</inkml:trace>
+  <inkml:trace contextRef="#ctx0" brushRef="#br0" timeOffset="26287.21">4674 4727 0,'0'0'16,"0"-17"15,0 34 0,18-17-15,0 53 15,-1-53-31,-17 18 0,18 17 16,-1 0 0,1-17-1,0-18 1,-18-18-1,17-17 1,36-36 0,36-17-1,-1-18 1,-35 71 0,52 0-1,-34 53 1</inkml:trace>
+  <inkml:trace contextRef="#ctx0" brushRef="#br0" timeOffset="27552.9">4727 5627 0,'0'17'141,"18"-17"-126,-1 36 1,-17-19-16,18 1 16,0 35-1,-18-35 1,17-1-16,-17 1 15,0-36 17,0 1-17,0-19 1,18 19-16,-18-19 16,18-52 15,17-18-16,18 0 1,0 54 0,35 16-1,-17 36 1,-19 0 0,-34 18-1,0 17 1</inkml:trace>
+  <inkml:trace contextRef="#ctx0" brushRef="#br0" timeOffset="28470.33">4886 6332 0,'0'18'63,"35"35"-32,-17-35-31,-18 17 15,35 0 1,-35-17 0,18-18-1,-1-18 17,1-35-17,17 0 1,-35 18-16,36-36 15,-1-34 1,18 16 0,0 36-1,17 18 1,-17 35 15,-18 35-15,1 1-1,-36-1 1,0 0 0,0-17-16</inkml:trace>
+  <inkml:trace contextRef="#ctx0" brushRef="#br0" timeOffset="31537.6">4233 7937 0,'0'0'0,"0"-17"0,18 17 16,-18-18 0,0 1-1,18 17 1,-1 0 0,1 0-1,0 17 1,34 1-1,-16-1 1,-19 1-16,19 0 16,-19-1-16,19 36 15,-19 0 1,-17 18 0,-17-18-1,-19 17 1,1 1-1,0-18 1,35 0 0,-18-18-1,18 35 1,18 1 15,-18 0-15,17-36-1,1 35 1,17-17 0,18-17-1,18-1 1,-36-17 0,18 17-1,-18-18 1,-35 1 31,-17-18-47,-19 18 15,-34 17 1,-1-17 0,54-1-1,-36 36 1,0 0-1,35 18 1,18-1 0,35 18-1,-17-35 1,35 71 0,-35-54-1,17 36 1,-18 0-1,1-35 1,0 17 0,-1 0-1,-17-53 1,0 18 15,0-35-15,-17-1-1,-1 1 1,-17-18 0,-18 0-1,0 18 1,0-18 0,35 0-1,-17 0 1</inkml:trace>
+  <inkml:trace contextRef="#ctx0" brushRef="#br0" timeOffset="42456.8">6509 7743 0,'0'-17'16,"-18"17"30,18 17-30,0 1 0,0 0-16,0-1 15,0 36 1,0-35-16,0 35 16,-18 17-1,1 19 1,17-1 15,-35 0-15,17-35-1,-35 35 1,-18 18 0,-17-18-1,-35 0 1,35-52-1,-18 34 1,0-17 0,0 0-1,36-18 1,-36 18 0,-35 0-1,-1-18 1,72-17 15,-18-18-15,70 18-1,0-18 1,1 0 0,-1 0 15,1 17-16,-1-17 1</inkml:trace>
+  <inkml:trace contextRef="#ctx0" brushRef="#br0" timeOffset="42943.16">5080 8837 0,'0'0'0,"0"-18"16,18 18-1,-18 18 1,0 0-1,0-1-15,-18 54 32,0-18-32,-17 17 15,0 1 1,0-36 0,17 0-1,18-17 1,18-18 31,-1 0-32,18 0 1,54 18 0,-1-1-1,-35 1 1,-36-18-16,36 18 15,-17-1 1</inkml:trace>
+  <inkml:trace contextRef="#ctx0" brushRef="#br0" timeOffset="49677.24">388 9013 0,'0'0'15,"0"-17"1,18 17-1,-1 0 1,1 0 0,-18 17 15,18-17 16,-18 18-32,17-18 1,1 0 15,0 0 1,-1-18-17,-17 1 16,-17 17-15,-19 0 0,19 0-1,34 0 1,19 0 0,-54-18 15,0 18-16,1 0 1,-1 18 0,36 17-1,17 36 1,0-18 0,-35-36-16,18 18 15,35 18 1,-53-35-1</inkml:trace>
+  <inkml:trace contextRef="#ctx0" brushRef="#br0" timeOffset="50044.64">123 9066 0,'0'0'0,"-17"0"15,17 18-15,17 0 16,1-1-16,35 19 16,35 16-1,0 19 1,1-36 15,-36-17-15,-18-18-16</inkml:trace>
+  <inkml:trace contextRef="#ctx0" brushRef="#br0" timeOffset="50296.69">512 8943 0,'0'0'16,"17"-18"-16,1 18 0,52 0 16,54 53-1,-54 0 1,19 35 15,-107 53-15,-88-35-16</inkml:trace>
+  <inkml:trace contextRef="#ctx0" brushRef="#br0" timeOffset="53795.48">3193 9666 0,'-18'0'0,"18"18"16,0-1-1,0 1-15,0 17 16,18 18-1,17 18 1,0-1 0,0-17-1,1 0 17,17-18-17,0-35 1,-18 0-16</inkml:trace>
+  <inkml:trace contextRef="#ctx0" brushRef="#br0" timeOffset="56513.66">3510 9666 0,'0'0'0,"0"-18"16,-18 18 0,18-17-16,0-1 15,18 1 1,17-1 0,-17 0-16,17 1 15,18-1 1,0 18-1,-53 18 17,-17 35-17,-19-18 17,1 0-17,35-17-15,-18-1 16,36 1-1,0-18 1,-1 0 0,19 0-1,-19 0-15,18 0 16,1 0 0,-1 18-1,-35-1 1,0 36-1,-35-35 1,-18 17 0,-18-17 15,18-1-15,18-34-16</inkml:trace>
+  <inkml:trace contextRef="#ctx0" brushRef="#br0" timeOffset="56863.86">3828 9402 0,'-18'0'16,"36"0"-16,-18 17 31,35 1-15,35 17-1,-34-17-15,34 35 16,-52-36-16,35 54 16,-71 35-1,-88-18 1</inkml:trace>
+  <inkml:trace contextRef="#ctx0" brushRef="#br0" timeOffset="67017.38">4127 8220 0,'-17'0'16,"17"-18"-1,17 18 1,1 0 0,-18 18-1,18-1 1,-1 1-1,-17 0-15,18-1 16,0 19 0,-1-36 15,-17-18-15,36-35-1,34-18 1,-17 19 15,-18 34-31,54-88 16,-19 53-1,1 0 1,-71 71 0,0-1-16</inkml:trace>
+  <inkml:trace contextRef="#ctx0" brushRef="#br0" timeOffset="67568.27">4198 8855 0,'18'0'47,"-18"17"-31,17-17-16,1 0 15,-18 18-15,35 0 16,-17 17 0,17-17 15,-35-1-16,18 1 1,-18-36 0,35-35-1,18 0 1,88-70 0,53-36-1,18 36 1,-71 70-1,-106 53 1</inkml:trace>
+  <inkml:trace contextRef="#ctx0" brushRef="#br0" timeOffset="68986.67">900 10231 0,'0'0'0,"-18"0"0,-17-18 31,35 0-31,17 18 0,1 0 15,70-17 1,71-1 0,141 0-1,-36-17 1,160 17 0,34 1 15,-317 17-16,18 17 1,-106 1 0,-35 0-1</inkml:trace>
+  <inkml:trace contextRef="#ctx0" brushRef="#br0" timeOffset="80056.28">11042 5891 0,'18'0'78,"-1"0"-62,1 0-1,70 0 1,0 0 0,-52 0-16,122 0 15,-52 0 1,53-17 0,-53 17-1,-53-18 1</inkml:trace>
+  <inkml:trace contextRef="#ctx0" brushRef="#br0" timeOffset="80473.35">11201 5962 0,'0'0'0,"17"0"0,1 0 0,35 0 31,-18 18-31,106-18 16,-35 0-1,53 0 1,-71 0-1,-17 0 1,-36 0 0</inkml:trace>
+  <inkml:trace contextRef="#ctx0" brushRef="#br0" timeOffset="81706.45">1711 3334 0,'18'0'15,"-1"0"-15,19 0 16,-19 0 0,36 0-16,71 0 31,-19-18-15,-69 18-16,122-18 15,-69 1 1,-1 17-1,-53 0 1,-17 0 0</inkml:trace>
+  <inkml:trace contextRef="#ctx0" brushRef="#br0" timeOffset="82075.25">1852 3563 0,'18'0'16,"-1"0"0,1 0-16,0 0 15,17-18-15,0 18 0,36 0 16,17 0 0,88-17-1,-123 17 1,-17 0-1,-36 17 17</inkml:trace>
+  <inkml:trace contextRef="#ctx0" brushRef="#br0" timeOffset="86510.82">5256 2364 0,'0'0'0,"0"-18"32,-17 18-32,17-18 15,-18 1 16,0 17-15,1-18 0,-1 18-1,-17 0 1,17 0-16,-35 0 16,-52 0-1,-37 18 1,-16-18-1,34 0 1,-35 17 0,18 1-1,18 0 1,35-18 0,-18 35-1,-18 18 1,19 0 15,-1-18-15,35 18-1,-17 35 1,53-35 0,-1 35-1,1-17 1,17-18-1,-17 17 1,18 1 0,17-18-1,0-36-15,0 19 16,17 34 0,18 1-1,18-18 1,0-18-1,53 35 17,0-34-17,35-1 1,-17 0 0,-19-17-1,36 17 1,1-17-1,52 17 1,-71-35 0,89 0-1,-18 0 1,-18 0 0,-70-17-1,106-1 16,-124 0-15,35 1 0,18-19-1,-52 19 1,34-1 0,1-17-1,-19 17 1,1-17-1,-53 17 1,18 1 0,-18-36-1,17 17 1,-52 1 0,17 0-1,-35-18 1,0 0 15,-35-18-15,17 19-1,-17-19 1,-18-17 0,-18 0-1,1 35 1,-18-18-1,0-17 1,-18 17 0,17 1-1,19 35 1,-54-1 0,-17 1-1,36 17 16,34 1-15,18-1 0,-35 0-1,0 1 1,-36 17 0,36 0-1,-18 0 1,18 0-1,35 17 1,18-17 0,17 0 15,0 18-15</inkml:trace>
+  <inkml:trace contextRef="#ctx0" brushRef="#br0" timeOffset="107383.71">13776 6597 0,'-18'0'47,"1"-18"-31,-1 18-1,36 18 17,-1-18-1,1 0-31,0 0 15,35 0 1,17 0 0,-17 0-1,-35 0-15,17 0 16</inkml:trace>
+  <inkml:trace contextRef="#ctx0" brushRef="#br0" timeOffset="107700.32">13652 6720 0,'18'0'31,"0"0"-15,-1 0-16,19 0 15,52 0 1,18-17 0,-53 17-1,-18 0-15,18 0 31,-36 0-15</inkml:trace>
+  <inkml:trace contextRef="#ctx0" brushRef="#br0" timeOffset="112203.51">6809 3175 0,'17'18'16,"-34"-36"-16,34 18 31,-17-18-31,53-17 16,18 0-1,-18 17-15,123-17 16,-70 17 15,-18 1-15,-53 17-1,-17 0 1,-18 17 0</inkml:trace>
+  <inkml:trace contextRef="#ctx0" brushRef="#br0" timeOffset="112968.45">7867 2822 0,'0'18'15,"0"-1"17,0 1-17,0 0-15,18-18 16,-18 53 0,0-36-16,17 19 15,-17 17 1,0-36-1,0 1 1,-17-36 0,-1-17-1,-35-36 1,0-35 15,18-35-15,17 0-1,36 71 1,35-18 0,35 70-1,-18 36 1,1 52 0,-18 18-1,-53 18 1,0-53-1,-35 35 1,-1-35 0,19-18-1,17-17 17,35 0-17,0-1 1,54 19-1,-1-1 1,-35-17 0,0-18-16</inkml:trace>
+  <inkml:trace contextRef="#ctx0" brushRef="#br0" timeOffset="113753.21">8202 2787 0,'0'0'0,"18"0"31,-18 18-15,17-18-16,19 0 31,-1 0-31,-17 0 15,17 0 1,0-36 0,-35 19-1,0-1 1,-18 0 0,-17 18-1,-18 36 1,36 17-1,17 17 1,17-17 0,36 0-1,53-35 17,-53-18-17,17-18 1,19-35-1,-36-18 1,-36-17 0,-52 35-1,-53 0 1,17 36 0,36 34-1,53 36 1,-1 0-1,71 0 17,-35-18-32,18-17 15,-1 17 17,-34-17-32,-19 17 31,1 18-16,-18-17 1,-18-1 0,-17 0-1,0-17 1</inkml:trace>
+  <inkml:trace contextRef="#ctx0" brushRef="#br0" timeOffset="114003.62">8837 2575 0,'0'0'15,"0"18"-15,18-18 0,-18 18 16,53 34-1,0 19 1,-1-36 0,-16 36-1,-19-36 1,-17-17-16</inkml:trace>
+  <inkml:trace contextRef="#ctx0" brushRef="#br0" timeOffset="114151.67">8819 2381 0,'0'0'16</inkml:trace>
+  <inkml:trace contextRef="#ctx0" brushRef="#br0" timeOffset="115002.78">9084 2575 0,'0'18'31,"0"0"-31,0-1 16,0 1-16,18 52 15,-1-34 1,-17-1-16,18 0 16,17 0 15,0-35-16,1-35 1,-19 0 0,1 17-16,-18-52 15,-35-18 1,-36-1 0,18 19-1,36 70 1,17 53-1,17 0 1,1 0 0,17-1-1,-35-34 1,18-18 15,-1 0-15,1-18-1,0-17 1,17-35 0,-17 34-1,35 19 1,-18 52 0,18 36-1,0-1 1,-18-17-1,-17-18 1,-18-52 31,0-19-47,17 1 16,-17 17-16,18-70 31,-18 53-16,35 35 1,0 53 0,18 53-1,-17-36 1,-19 1-16</inkml:trace>
+  <inkml:trace contextRef="#ctx0" brushRef="#br0" timeOffset="115453.9">8502 3510 0,'0'0'15,"0"-18"-15,0 1 0,-18-1 16,18 1-1,-35-1 1,17 53 0,1 53 15,17 1-15,0-54-16,17 53 15,36 18 1,35-71-1,-17-35 1,17-17-16</inkml:trace>
+  <inkml:trace contextRef="#ctx0" brushRef="#br0" timeOffset="116171.87">8872 3492 0,'-17'0'0,"34"0"0,-52 0 15,35 18-15,-18 0 16,18 17 0,0 18-1,36 0 17,-1-18-17,18-17 1,-18-36-1,18-17 1,-53-18 0,-18-18-1,-17 36 1,0 0 0,0 35-1,52 35 16,1-35-31,17 18 16,-17-18 0,35 0 15,0-18-31,-18 0 31,-17 1-15,-1 34 15,-17 19-15,18-1-1,17 36 1,18-1 0,0-17-1,-18-53 1,1-18-1,-19-52 1,1-18 0,-18 17-1,0 36-15,-18-18 16,-17 0 15,17 35-15</inkml:trace>
+  <inkml:trace contextRef="#ctx0" brushRef="#br0" timeOffset="116637.99">9507 3457 0,'0'0'0,"-17"0"0,17-17 15,0-19 1,0 19 0,35 17-1,0 17 1,1 36 0,-19-18-1,-17-17 1,18 17-1,-18-52 17,0-19-17,-18-34 1,18 17 0,18-18-1,17 36 1,0 53-1,1-1-15,17 72 16,-18-36 0,0-1-1,-17-16 17</inkml:trace>
+  <inkml:trace contextRef="#ctx0" brushRef="#br0" timeOffset="116853.79">9842 3157 0,'0'0'0,"0"-17"0,-17-19 16,17 19 0,17 70-1,1-18 1,-18 0-16,35 18 15,1 35 1,-1-35 0,-35-35-1</inkml:trace>
+  <inkml:trace contextRef="#ctx0" brushRef="#br0" timeOffset="117538.19">9895 3387 0,'0'0'15,"-17"-18"-15,-1-17 16,18-1 0,18 19-1,17-18 1,18 35 0,-18 0-1,36 17 1,-54 1-16,36-1 31,-35 1-15,-18 0-16,0 17 15,0-17 17,0 17-17,18-17 1,-1-18-1,36 17 1,-18-34 0,1-19-1,-19 1 1,-17 17-16,0-17 16,-17-18-1,-1 18 1,18 17-1,35 71 1,1 0 0,34 53-1,1 17 17,-1-17-17,-70-35 1,-17-1-1,-54-70 1,-35-70 0,36-18-1,17-54 1,53 37 0,70 69-1,-52 36-15</inkml:trace>
+  <inkml:trace contextRef="#ctx0" brushRef="#br0" timeOffset="119455.13">15222 6438 0,'0'18'32,"18"-18"-17,53 0 1,-36-18 0,35 18-1,19-17 1,-19 17-1,-35-18 1</inkml:trace>
+  <inkml:trace contextRef="#ctx0" brushRef="#br0" timeOffset="119722.12">15399 6279 0,'17'18'0,"-34"-36"0,52 36 0,0 0 16,1-1 15,-19 1-31,18 0 16,1 52-1,-36-35 1,-71 18 0,54-53-16</inkml:trace>
+  <inkml:trace contextRef="#ctx0" brushRef="#br0" timeOffset="121605.79">16369 6174 0,'0'-18'0,"0"36"0,-18-89 31,1 53-31,17 1 16,-36-36-1,-17 35 1,18 36-1,17-1-15,-34 36 16,-37 53 15,19 18-31,35-18 32,52-36-17,1-35 1,52-17-1,1-36 1,17-17 0,-35-18-1,0-35 1,-53-35 0,-53-1-1,18 71 1,-1 0-1,1 36 1,35 69 15,0-16-31</inkml:trace>
+  <inkml:trace contextRef="#ctx0" brushRef="#br0" timeOffset="121905.83">16140 6385 0,'-18'18'31,"36"0"0,-18-1-15,35 36 0,-35-35-16,17-1 0,1 19 31,0-19-15,-1 1-1</inkml:trace>
+  <inkml:trace contextRef="#ctx0" brushRef="#br0" timeOffset="122172.84">16492 6068 0,'0'0'0,"18"-18"16,-18 36 15,0-1-31,0 19 0,0 17 16,0 52-1,0-34 1,0-36 0,0 53-1,18-35 1</inkml:trace>
+  <inkml:trace contextRef="#ctx0" brushRef="#br0" timeOffset="122902.46">16404 6279 0,'0'0'0,"18"0"31,-1 0-15,19 0-16,-1 0 15,0 0 1,18 0 0,35-17-1,-70 17 1,-18 17 46,0 1-62,0 0 16,0 17 0,0-17-16,0 17 15,0-17 1,35-1-1,1-17 1,16-35 15,-34 17-15,17-52 0,-35 17-1,0 18 1,-17 70 15,-1 35-15,-17 36-1,17-35 1,1-36-16,-1 18 16,0 0-1,18 0 1,0-36-1,0-34 79</inkml:trace>
+  <inkml:trace contextRef="#ctx0" brushRef="#br0" timeOffset="123990.89">16016 6156 0,'0'0'0,"-18"-18"0,-34 1 31,69 17-16,36 0 1,0 0-16,141 17 31,-35 19-15,52-19 0,-105 19-1,-88-19 1,-53 1-1,-124 17 1,-88-17 0,35-1-1,124-17 1,88 18 0,106-18-1,106-18 1,-18 18-1,-53 18 17,-88 0-32,-71-1 31,-88 19-15,-105-19-1,69 1 1,1-18-1,124 17 1,105-17 0,18 0-1,52 0 1,-34 0 0,-54 0-1,-122 36 16,-37-19-15,-16 19 0,69-36-1,19 17 1,70 1 15,35-18-15,-18 0-1,-52 0-15,70 18 16,-53-18 0,-35 17-1,-53-17 1</inkml:trace>
+  <inkml:trace contextRef="#ctx0" brushRef="#br0" timeOffset="124905.49">17604 6156 0,'0'0'15,"0"-18"-15,0 1 16,0-1-16,-18 18 16,-17 18-1,-54 52 1,1 18-1,18 18 17,52 0-17,18-53 1,71 18 0,105-36-1,-123-35-15</inkml:trace>
+  <inkml:trace contextRef="#ctx0" brushRef="#br0" timeOffset="125441.27">17992 6403 0,'-18'0'32,"0"0"-32,1 0 15,-36 0-15,0 18 32,18-1-17,17 18 1,0 1-1,18-1 1,0 0 0,18-35-1,0 0-15,17 0 16,18-17 0,0-36-1,-18 0 1,0 18-1,-17-18 1,0 53 15,-18 35-15,0 0 0,0 53-1,0-52 1,17-1-1,1-35-15</inkml:trace>
+  <inkml:trace contextRef="#ctx0" brushRef="#br0" timeOffset="125791.29">18415 6350 0,'0'0'16,"0"-18"-16,0 1 0,0-19 15,-35 19 17,-36 52-17,18-17 1,18 35 0,35 0-1,35-18 1,18 0-1,-18-17 1,1 17 0,-36-17-1,-53 17 1,18-35 0,-18 18-1,17-18 1</inkml:trace>
+  <inkml:trace contextRef="#ctx0" brushRef="#br0" timeOffset="126289.71">18538 6438 0,'0'0'0,"18"0"0,-18 18 62,18-18-46,-1-18 15,1 18-31,0-17 16,-1-1-1,-17 0-15,0 1 16,18-19 15,-36 36-15,1 0 0,-1 36-1,-17 17 1,17-1-1,18-16 1,18-1 0,-1-35-16,19 18 15,34-18 1,36-18 0,-35-35-1,-36 35 1</inkml:trace>
+  <inkml:trace contextRef="#ctx0" brushRef="#br0" timeOffset="126524.01">18909 6227 0,'0'17'0,"0"-34"0,0 52 16,0-18-1,0 36 1,18-17-1,-1-19-15,1 19 16,-1 16 0,1-16-1,-71-1 1,-17-35 0,34 0-1</inkml:trace>
+  <inkml:trace contextRef="#ctx0" brushRef="#br0" timeOffset="127073.71">19403 6438 0,'0'18'62,"0"-1"-46,0 36-1,0-35-15,-18 35 16</inkml:trace>
+  <inkml:trace contextRef="#ctx0" brushRef="#br0" timeOffset="127409.75">19738 6068 0,'0'-18'0,"0"36"0,0-18 31,0 17-15,18 19 0,-18 17-16,17-18 15,1 35 1,-18-34-16,17 17 16,-17 17-1,0-52-15</inkml:trace>
+  <inkml:trace contextRef="#ctx0" brushRef="#br0" timeOffset="127724.29">19632 6068 0,'0'0'0,"0"-18"0,-18 0 15,18 1-15,0-1 0,18 18 32,17 0-17,36 35 1,35 18 0,-18 18-1,-35 0 1,-36-1-1,-69 1 1,-107-36 0,88-17-16</inkml:trace>
+  <inkml:trace contextRef="#ctx0" brushRef="#br0" timeOffset="153417.1">14623 7743 0,'88'0'0,"-176"0"0,229-17 16,-88 17-16,123-18 16,-105 1-16,34 17 15,1-18 1,18 18 15,-71 0-15</inkml:trace>
+  <inkml:trace contextRef="#ctx0" brushRef="#br0" timeOffset="153734.79">14799 7814 0,'18'0'0,"17"0"16,-17 0-16,34 0 16,72 0-1,-36-18 1,-17 18-1,35-17 1,-54 17-16,37 0 16,16-18-1,-87 18-15</inkml:trace>
+  <inkml:trace contextRef="#ctx0" brushRef="#br0" timeOffset="155403.89">14799 7955 0,'0'0'15,"-18"0"-15,1-18 0,-1 18 0,0-17 16,-34-1-1,-19 18 1,0-17 0,-34 17-1,52 17-15,-71 1 32,54-1-32,-36 36 15,53 0 16,-35 18-15,35 17 0,0 0-1,35 0 1,1 54 0,17-1-1,0 17 1,17-34-1,1-54 1,0 36 0,17-18-1,0 1 1,0-54 0,18 36-1,18-1 16,17-17-15,18 0 0,-18-18-1,71-17 1,-18-1 0,18-17-1,-71-17 1,53-36-1,-18 18 1,1-36 0,-54 18-1,19-53 1,-1-52 15,-71 69-15,19-34-1,-36-18 1,-18 17 0,-17-52-1,-18 17 1,-18 36 0,18 70-1,-35-18 1,-18 36-1,-17 17 1,35 1 0,-106-19 15,70 36-15,36-17-16,-18 17 15</inkml:trace>
+  <inkml:trace contextRef="#ctx0" brushRef="#br0" timeOffset="156935.32">14693 10707 0,'0'0'0,"0"-18"0,-35 18 16,35-17-16,-35 17 15,-54 0 16,-52 17-15,-17 1 0,34-1-1,54 19 1,-19 52 0,1 18-1,53-36 1,17-34-16,-17 52 15,0 18 1,35-1 0,35-16-1,0-36 1,53 17 0,18 1-1,35-18 16,36-18-15,-54-35 0,71 0-1,0-53 1,-17 0 0,-89 0-1,0-70 1,-35-18-1,-53-36 1,-53 1 0,0 70-1,-53-35 1,-52 88 0,-36 35 15,70 18-16,71 0-15</inkml:trace>
+  <inkml:trace contextRef="#ctx0" brushRef="#br0" timeOffset="159035.97">26811 3157 0,'0'0'16,"0"-17"-16,0-19 16,-18-16 15,1 34-31,-18 18 15,-18 18 1,17-1 0,1-17-16,0 35 15,-36 36 1,71 17 15,36 36-15,16-1-1,-16-52 1,-1 87 0,-17-16-1,-36-1 1,0-53 0,1-35-16,-19 17 15,-52 19 1,0-19-1,0-17 1,35-35 0,0-1-1,18 1 17,35-36-1,35 18-16,-17-17-15,35 17 16,70 0 0,-17 53-1,-53-1 1,0 90 0,-71-37-1,-35 54 1,18-53-1,-36 53 1,18-1 0,18-34-1,0-18 1,35-36 0,17 19 15,19-19-16,-1-17 1,-17-18 0,17 18-1,0-18 1,1-17 0,-19-18-1,1-35 1</inkml:trace>
+  <inkml:trace contextRef="#ctx0" brushRef="#br0" timeOffset="160122.15">25294 4198 0,'0'0'0,"-35"-35"31,17 17-31,1-17 31,-1 17-31,18-17 16,18-36-1,35 36 1,17 17 0,-35 54-1,18 34 1,0 36 0,-70 0-1,-1-53 1,0-18-16,-35 18 15,-17 0 1,-18-18 0,35-17-1,35-18 1,0-35 15,18-1-15,18-17-1,0 18 1,17-18 0,18 36-1,-18 52 1,18 35 0,-35-17-1,17 36 1,0-37-1,36 1 1,-36-35 0,36-18-1,-1-35 1</inkml:trace>
+  <inkml:trace contextRef="#ctx0" brushRef="#br0" timeOffset="160502.87">25735 3792 0,'0'0'16,"18"0"-16,17 0 15,-17 0-15,-1 18 0,54 53 32,-1-1-17,-17 71 1,-35 0-1,-71 0 1,-35-17 0,17-71-1,-35 0 1,18-36-16</inkml:trace>
+  <inkml:trace contextRef="#ctx0" brushRef="#br0" timeOffset="160888.7">24836 3845 0,'0'0'0,"0"18"0,-53 17 16,35 0-16,-17 36 15,-18 88 1,35 17-1,36 18 1,17-88 0,71 35-1,17-35 1,-70-88 0</inkml:trace>
+  <inkml:trace contextRef="#ctx0" brushRef="#br0" timeOffset="199268.67">26599 13723 0,'-17'-18'62,"-1"71"-46,-17-17-1,17-19 1,18 1-16,0 17 16,-17 36-1,17-18 1,0 17 0,0 1-1,0-1 16,0 1-15,35 52 0,-35 1-1,18-54 1,-18 1 0,0 17-1,0-35 1,0-18-1,0 36 1,0-18 0,0-36-1,0 54 1,-18-36 0,0 1 15,-17-1-16,17-18 1,1 1 0,34 0 171,1-1-187,17 19 0,-17-19 16,0 1-1,-18 52 1,17 1 0,18-18-1,-35 0 1,0 17 0,18-17-1,-18 0 1,0 35-1,0 18 1,0-35 0,0-18-16,0-18 15,0 36 1,0-36 0,0 0-1,0 18 16,0 0-15,0-18 0,0 1-1,0 16 1,18-34 0,-18 17-1,0 1 1,17-36 15,1 0 0,0 17-15</inkml:trace>
+  <inkml:trace contextRef="#ctx0" brushRef="#br0" timeOffset="204331.76">24606 6738 0,'0'0'0,"-17"0"16,-19 0 0,1 0-1,0 0-15,-89 0 16,-34 0 0,-54 0-1,-123 0 16,158 0-15,54 0 0,52 0-1,-17 18 1,35-1 0,18-17-16,0 53 31,-18-35-31,35 35 15,-35 17 1,53-17 0,-53 71 15,53-54-31,0 1 31,0-1-15,36 19-1,52 16 1,35-34 0,142 35-1,35-36 1,0-34 0,-142-36-1,107 70 16,-106-70-15,-1 0-16,19 0 16,-19 0-1,-16-88 1,-54 88 15,-35-71-15,0 36-1,-18-35 1,18 34 0,-53 19-1,35-19 1,0-34 0,-35 52 15,0 1-16,0-19 1,0 1 0,0 0-1,0-1 1,0-34 0,-53-1-1,-17 1 16,17 35-15,0-1-16,18 1 16,0 17-1,17 1 1,18-1 0,-18 18-1,1 0 1</inkml:trace>
+  <inkml:trace contextRef="#ctx0" brushRef="#br0" timeOffset="205332.14">25912 7832 0,'0'0'0,"70"176"31,-52-141-31,-1 36 16,1-1-1,17 19 1,-17-19 0,17 71-1,0-70-15,1 70 16,17 53-1,-36 18 1,1 70 0,52-18-1,1 19 17,-18-1-17,0 0 1,17-17-1,-34 70 1,52-106 0,-35 53-1,53 36 1,-71-106 0,-17-18-1,52-18 1,-35-17-1,1-71 1,-36-18 0,0 1-1,0-53 17,17 35-17,-17-18 1,0 0-1,0 53 1,0-52 0,0-1-1,0 18 1,18-36 15,-18 1-15</inkml:trace>
+  <inkml:trace contextRef="#ctx0" brushRef="#br0" timeOffset="206116.68">26846 13088 0,'36'18'31,"-19"-18"-31,-17 17 15,18 1 1,52 35 0,-34-18-1,17 36 1,-18-36 0,18 18-16,-35-53 15,17 18 1,-18-1-1,19-17 1,17 0 0,-18 0-1,18 0 1,-18-35 15,-35-18-15,18-18-1,35 36 1,-36-18 0,54-17-1,-18 17 1,0 17 0,-36 19-1,1 17 1</inkml:trace>
+  <inkml:trace contextRef="#ctx0" brushRef="#br0" timeOffset="-201713.87">2663 16792 0,'18'0'62,"35"0"-46,-18 0-16,1 0 15,-1 0-15,88 0 16,1 0 0,229 0 15,-230 18-16,-35-18-15,71 0 16,-36 0 0,-70 0-1,-17 0 1,-19 0 0</inkml:trace>
+</inkml:ink>
+</file>
+
+<file path=ppt/ink/ink2.xml><?xml version="1.0" encoding="utf-8"?>
+<inkml:ink xmlns:inkml="http://www.w3.org/2003/InkML">
+  <inkml:definitions>
+    <inkml:context xml:id="ctx0">
+      <inkml:inkSource xml:id="inkSrc0">
+        <inkml:traceFormat>
+          <inkml:channel name="X" type="integer" max="1920" units="cm"/>
+          <inkml:channel name="Y" type="integer" max="1080" units="cm"/>
+          <inkml:channel name="T" type="integer" max="2.14748E9" units="dev"/>
+        </inkml:traceFormat>
+        <inkml:channelProperties>
+          <inkml:channelProperty channel="X" name="resolution" value="55.81395" units="1/cm"/>
+          <inkml:channelProperty channel="Y" name="resolution" value="55.6701" units="1/cm"/>
+          <inkml:channelProperty channel="T" name="resolution" value="1" units="1/dev"/>
+        </inkml:channelProperties>
+      </inkml:inkSource>
+      <inkml:timestamp xml:id="ts0" timeString="2023-02-03T03:55:22.315"/>
+    </inkml:context>
+    <inkml:brush xml:id="br0">
+      <inkml:brushProperty name="width" value="0.05292" units="cm"/>
+      <inkml:brushProperty name="height" value="0.05292" units="cm"/>
+      <inkml:brushProperty name="color" value="#FF0000"/>
+    </inkml:brush>
+  </inkml:definitions>
+  <inkml:trace contextRef="#ctx0" brushRef="#br0">6421 1817 0,'52'0'109,"1"0"-109,18 17 16,17-17-16,-17 18 16,17-18-1,106 53 1,-88-35-1,-53-18 1,-36 0 0</inkml:trace>
+  <inkml:trace contextRef="#ctx0" brushRef="#br0" timeOffset="1031.18">6473 2046 0,'0'-18'62,"53"18"-30,53 0-17,-35 0-15,-18 0 32,-18 0-17,-17 0 1,-1 0 15,1 0-31,17 0 16,-17 0-1,-1 0 1,19 0 31</inkml:trace>
+  <inkml:trace contextRef="#ctx0" brushRef="#br0" timeOffset="10942.14">1676 3916 0,'35'0'62,"-17"0"-46,-1 0 15,19 0-31,-19 0 16,1 0-1,35 0 1,17 0-1,-17 0 1,35 0 0,-35 0-1,18 0 1,-36 0-16,36 0 16,-18 0-1,0 0 1,-1 0 15,54 0-15,-18 0-1,18 0 1,35 0 0,-35 0-1,53 0 1,-36 0-1,1 0 1,-54 0 0,54 0-1,-53 0 1,-19 0 0,19 0-1,-18 0 1,-18 0-1,-17 0 17,35 0-17,35 0 1,0 0 0,-17 0-1,87 0 1,1 0-1,0 0 1,17 0 0,-52 0-1,17 0 1,-53 0 0,0 0-1,-35 0 1,-18-18 15,1 18-31,-19 0 16,19 0-1,-1 0 1,36 0 0,17 0-1,35 0 1,-35 0-1,-17 0 1,-18 0 0,-18 0-1,0 0 17,-17 0-17,0 0-15,17 0 47,0-17-31,1 17 31,-36-18-32,17 18 1,36 0-1,-35 0 1,17-18 0,-17 18 15,-1 0 0</inkml:trace>
+  <inkml:trace contextRef="#ctx0" brushRef="#br0" timeOffset="23414.58">29087 3969 0,'17'0'16,"1"0"15,-1 0-15,1-36-1,0 36 1,-1 0 15,1 0-15,88 0-1,35 0 1,53 0 0,35 18-1,-105 0 1,-54-18-1,-34 0 1,-1 0 0,-18 0-1,1 0 1</inkml:trace>
+  <inkml:trace contextRef="#ctx0" brushRef="#br0" timeOffset="38637.08">5450 4762 0,'18'0'31,"35"0"0,-35 0-31,35 0 16,35 0-1,18 0 1,-18 0 0,18 0-1,-54 0 1,1 0 0,-17 0 15</inkml:trace>
+  <inkml:trace contextRef="#ctx0" brushRef="#br0" timeOffset="39350.26">7814 4904 0,'0'0'0,"53"0"0,-18 0 15,53 0 1,142 0 0,-72 17-1,1 19 1,-124-36-16,1 0 16</inkml:trace>
+  <inkml:trace contextRef="#ctx0" brushRef="#br0" timeOffset="103707.98">11289 9384 0,'0'0'0,"18"0"140,-1 0-77,1-18-48,-1 18-15,1 0 32,0 0 155,35 0-171,-36 0-16,19 0 15,-19 0 1,18 0 0,-52 0 46,34 0 48,1-17-95,0 17 1,17 0 15,-17-18-31,-1 18 0,1 0 16,35 0-1,-36 0 1,36-18 15,0 18-15,-53 18 15,-17-18-15,-36 18-1,0-1 1,0 1 0,35-18-1,18 18 1,18-36 15,0 0-15,17 1-1,0-1 1,0 0 0,-17 1 15</inkml:trace>
+  <inkml:trace contextRef="#ctx0" brushRef="#br0" timeOffset="106013.64">1605 11871 0,'0'0'0,"-35"18"16,17-18-1,1 17-15,-19 19 16,1 16 0,17-16-1,-17 34 1,35 18 15,0 1-15,18-19-1,17-17 1,-17-18-16,17 1 16,18 17-1,35-18 1,-17-17 0,34-1-1,19-17 1,-1-35-1,-17-36 1,-18 18 0,1-52-1,-19-1 17,-35-18-17,-35 54 1,0-18-1,-17 17 1,-18 36 0,-1-1-1,-17 19 1,-35-19 0,0 19-1,-36-1 1,-17 18-1,53 18 1,-35-1 0,17 19 15,18-1-15,52 0-1,1 18 1,35-35-16</inkml:trace>
+  <inkml:trace contextRef="#ctx0" brushRef="#br0" timeOffset="106895.24">1940 12665 0,'-17'0'32,"17"-18"-32,0 36 31,0-1-16,17 19 1,-17 17 0,18-18-1,-18 0-15,0 0 16,-18 36 0,1-18-1,17-18 1,0-17-1,35-18 1,0 0 15,53-18-15,18 0 0,-18 1-1,54-1 1,-1 18-1,-18-17 1,-70 17 0,0 0-1,-18-18 1,18 0 0,-18 1-1,-17 17 1,-18-18-16</inkml:trace>
+  <inkml:trace contextRef="#ctx0" brushRef="#br0" timeOffset="107664.16">3228 12629 0,'-53'-35'32,"35"35"-32,-35 18 15,18 35 17,-18 17-17,18-34 1,35-1-16,-35 0 15,17 36 1,18-1 0,18-35-1,-1-17-15,36 0 16,18 17 0,35-17-1,-18-18 1,-18 0-1,54-36 17,-71 19-17,17-19 1,-17 1 0,-53 18-16,53-36 15,-53 17 1,0-34-1,-17-18 1,-19 52 0,19 1-16,-36 0 15,-18 0 1,1 17 0,-1 18-1,36 18 1,-36 17-1,1 0 1</inkml:trace>
+  <inkml:trace contextRef="#ctx0" brushRef="#br0" timeOffset="108359.26">3263 13088 0,'0'0'0,"18"0"31,-1 0-15,1 0-1,0 35 1,-1-17-16,-17 0 15,18 17-15,-18 18 16,18 70 0,-18-17-1,0-53 1,0 0 0,17-18-1,-17 0 1,0-17-1,18-18 1,17 0 0,53 0 15,36-18-15,-36 1-1,71-1 1,-36-17-1,-35 17 1,-35 18 0,-35 0 15,-18-17 0</inkml:trace>
+  <inkml:trace contextRef="#ctx0" brushRef="#br0" timeOffset="108996.35">4304 13353 0,'0'0'0,"-35"-18"15,17 18 1,0 0 0,18 18-1,-17 35 1,17-36-1,-18 18-15,18 54 16,0-36 0,18 17-1,35-17 17,35-18-17,35-17 1,-52-18-1,52-35 1,-35-18 0,-17-18-1,-36 18 1,-35-35 0,-35 0-1,-18 0 1,0 52-1,-35 1 1,0 35 0,17 18 15,36-1-15,17 1-1,1 35-15</inkml:trace>
+  <inkml:trace contextRef="#ctx0" brushRef="#br0" timeOffset="109732.75">4604 13847 0,'35'-53'31,"-35"35"-31,18 18 16,-1-18-1,1 36 17,-18 0-17,0-1-15,0 19 16,18 34-1,-1 18 17,-17-17-32,0-36 15,18 18 1,-18 18 0,0-19-1,17-16 1,1-36-1,0 0 1,35-18 0,53 0-1,-1 1 1,-52-1-16,88 1 16,89-36-1,-1 17 1,-70 1-1,-106 35 1,-36 0 0,-34 0 15,-1 0-15,0 0-16</inkml:trace>
+  <inkml:trace contextRef="#ctx0" brushRef="#br0" timeOffset="110180.88">6015 14005 0,'-18'0'16,"1"0"-1,-1 18-15,0 0 16,-17 17 0,35 35-1,18 1 17,17-53-17,35 17 1,1-18-1,17-17 1,-52-17 0,-1-18-1,-35-36 1,-53-17 0,0 35-1,18 35-15,-106 1 31,35 17-15,-53 53-16,88-18 16</inkml:trace>
+  <inkml:trace contextRef="#ctx0" brushRef="#br0" timeOffset="111248.75">4762 14287 0,'18'0'15,"0"0"1,-1 0 15,1 0-15,0 18-16,-18 0 15,35 35 1,-35 17 15,0-17-15,0-18-16,0 18 16,0 36-1,0-1 1,0-53-1,0 0 1,35-35 0,18-17-1,35-1 1,1 0 0,69-17-1,1 0 1,-35 17-1,-54 18 17,-17-17-17,18 17 1,-1 0 0,1-18-1,-54 18-15</inkml:trace>
+  <inkml:trace contextRef="#ctx0" brushRef="#br0" timeOffset="111798.22">6032 14623 0,'0'-18'15,"18"18"16,0-18-15,-1 18 0,1 0 15,-36 0 0,1 18 0,17 0-31,-18-1 16,18 19 0,0-1-1,0 18 1,35-18 0,18 0-1,0-35 1,-35 0-1,17 0-15,18-35 32,-35-18-17,-36-17 1,0 17 0,-52-18-1,-18 53 1,-18 36-1,18 0 1,-18 17-16</inkml:trace>
+  <inkml:trace contextRef="#ctx0" brushRef="#br0" timeOffset="113165.41">3404 13794 0,'0'0'0,"0"-18"15,0 0 1,0 1 15,0 34 16,0 1-31,0 17-1,18 18-15,0 53 16,17 0 0,0 53 15,0 17-15,18 0-1,-35 1 1,0-71-1,-1 35 1,-17-18 0,18-35-1,-18-35 1,0-35-16,18 17 16,-18-17-1,17-1 1,-17 1-1,18-18 17,17 0-17,0 0 1,1 0 0,-1 0-1,0 0 1,36-18-1,-1 1 1,18-1 0,-52 18-1,17-17 1,-36 17 0,19-18-1,-19 18 16,1 0-15</inkml:trace>
+  <inkml:trace contextRef="#ctx0" brushRef="#br0" timeOffset="113866.97">4692 15187 0,'18'0'16,"-1"0"-1,-17-18-15,0 1 47,-17 17-31,-36 0 0,17 17-1,-17 1 1,-17 17-1,52 1 1,1-19-16,-1 1 16,0 35-1,18-18 1,36 18 0,-1-35-1,35-1 1,19 1-1,-19-18 17,36-35-17,-18-1 1,-35-17 0,-35 1-1,-36-19 1,-17-17-1,-36 17 1,-17 54 0,18 17-1,-19 35 1,19 0 0,35 0-1</inkml:trace>
+  <inkml:trace contextRef="#ctx0" brushRef="#br0" timeOffset="115348.88">3828 15381 0,'0'18'31,"0"-1"-16,0 1 1,17 0 0,-17 17-1,18 0 1,-18-17-16,0 35 16,18 53-1,17-1 1,-18-52-1,1 53 1,-18-35 0,18-18-1,-1-18 1,-17-17 0,36-1-1,-1-17 1,0 0 15,36-17-15,-18 17-1,70-36 1,54 1 0,17-18-1,-53 35 1,17 1-1,-69 17 1,-54 0 0,-35 17-1</inkml:trace>
+  <inkml:trace contextRef="#ctx0" brushRef="#br0" timeOffset="115815.84">5133 15946 0,'-18'0'16,"1"0"0,-1 0-1,0 17 1,1 1-1,-19 17 1,19 0 0,17 18-1,0-17-15,17-1 16,19 35 0,34-17-1,-17-35 1,18 0-1,-18-54 17,0-17-17,-36-17 1,-34-36 0,-36-17-1,-36 34 1,1 89-1,35 0 1,-35 36 0,71-19-16</inkml:trace>
+  <inkml:trace contextRef="#ctx0" brushRef="#br0" timeOffset="117418.52">4868 15293 0,'-17'0'16,"34"18"15,-17 17-15,18-35 0,-18 53-16,18 0 15,-18-18 1,17 18-1,-17 0 17,18-18-17,0-17 1,-18-1-16,0 1 16,17-18-1,1 18 1,35-36-1,0 0 1,52-17 0,19-18-1,-1 18 1,-52 17 0,0 1-1,-36 17 1</inkml:trace>
+  <inkml:trace contextRef="#ctx0" brushRef="#br0" timeOffset="117900.05">5768 15399 0,'0'0'0,"-53"-18"16,35 18-1,1 0 1,-1 0-16,0 18 15,18 17 1,-17 0 0,17 1-1,35 34 1,18 1 0,-18-54-1,53 1 1,-17-53-1,0-18 1,-54 0 0,-17 0-1,-35 0 1,-36 18 0,1 35-1,35 0 16,-1 17-31</inkml:trace>
+  <inkml:trace contextRef="#ctx0" brushRef="#br0" timeOffset="120208.64">3369 13106 0,'0'17'62,"0"1"-15</inkml:trace>
+  <inkml:trace contextRef="#ctx0" brushRef="#br0" timeOffset="122002.29">1940 13053 0,'-17'0'0,"34"0"0,-34-18 15,-1 18 1,18-18-16,18 36 47,-18 0-47,17 35 15,1 17 1,0 89 0,17 35-1,18 0 1,-18 18 15,18-71-15,-35-71-16,17 89 15,35 88 1,-17 0 0,-17-88-1,-1 52 1,-35 1 0,0-18-1,0-70 1,18 70-1,17-18 1,-18 0 0,1-34-1,-18-54 1,18 18 0,-1-1 15,19-34-16,-1-18 1,0 17 0,18 1-1,0-18 1,-18 0 0,-17-36-1,0 36 1,-1-35-1,-17 0 1,18-1 0,35-17 15,0 0-15,35-35-1,35 0 1,-34 17-1,34 0 1,-17 18 0,-36 0-1,-34 18 1,-1-18 0,-17 0-1,17 0 1</inkml:trace>
+  <inkml:trace contextRef="#ctx0" brushRef="#br0" timeOffset="122670.05">4004 16739 0,'0'0'0,"0"-17"0,0-19 32,0 19-17,-18 17 1,1-18 0,-19 18-1,19 18 1,-36 17-1,18 0 1,-18 36 0,35-36-1,18-17-15,0 35 16,0 17 0,35 1 15,18-18-16,-17-36 1,52 19 0,18-36-1,-1-18 1,-52 0 0,18-35-1,-1-35 1,-52-18-1,-18-17 1,-35 52 0,-18-17-1,-18 18 1,1 70 0,17 0-1,-35 35 16,-1 18-15,54 0 0</inkml:trace>
+  <inkml:trace contextRef="#ctx0" brushRef="#br0" timeOffset="175038.62">6279 11712 0,'0'-35'15,"0"17"1,0 1 0,0 34 31,0 1-32,0 0-15,18 34 16,-18 1-1,18 0 1,-1 0 0,1-35 15,0 0-15,-18-36 15,-18 0-16,-17-35 1,17-17 0,0-1-1,18 36-15,0-18 16,18-18 0,35 36-1,-18 18 1,53 17-1,-35 35 1,-17 18 15,-36-18-15,-53 36 0,-18-1-1,-17 1 1,35-54-1,18 1 1,35-36 0,0 1 15,17 17-31,19-18 0,-1 18 16,36 18-1,17 17 1,-18 0-1,-52-35 1</inkml:trace>
+  <inkml:trace contextRef="#ctx0" brushRef="#br0" timeOffset="175804.94">6403 11324 0,'0'0'0,"0"-17"16,-18-1-16,-17 0 31,17 18-31,-17-17 16,-53 34-1,-36 19 1,-17 52-1,35 18 1,54-36 0,34 71-1,36-17 1,34-36 0,37 35-1,34-17 1,1-35-1,17-54 1,-53-17 0,53-53 15,0-52-15,-35-36-1,-53 35 1,-35 35-16,-1-35 15,-34-52 1,-54 34 0,-17 36-1,0 53 1,-54 17 0,1 18-1,36 35 1,34 18-1,53-18 1,18-17 0</inkml:trace>
+  <inkml:trace contextRef="#ctx0" brushRef="#br0" timeOffset="176655.57">6597 12347 0,'0'-17'16,"0"-1"15,0 36 16,0-1-32,18-17 1,-18 18-16,17-1 16,1 1-1,-1 35 1,-17-18-1,18 1 1,-18-1 0,0 0-1,0-17 1,18-1 0,-1 1-1,36-18 1,0 0-1,-17-18-15,16 1 16,54-18 0,-18 17 15,-35 0-15,-35 18-1,-53 0 16</inkml:trace>
+  <inkml:trace contextRef="#ctx0" brushRef="#br0" timeOffset="177622.67">7250 12241 0,'-18'-35'31,"18"17"-31,-35 18 16,-18 0-1,17 18 1,1 53-1,18 34 17,17-69-32,17-1 15,18 89 1,36-19 0,0-52-1,-36-35-15,53 17 16,71-35-1,0-17 1,-18-54 0,-53 0-1,-18-70 1,-34-35 0,-54-18-1,-35 35 1,-17 89-1,-89 52 1,0 18 0,18 53 15,88 0-15,-18 17-1,54 1-15</inkml:trace>
+  <inkml:trace contextRef="#ctx0" brushRef="#br0" timeOffset="178058.68">7691 12347 0,'0'0'16,"0"-17"-16,0-54 31,0 53-31,-18 1 16,-17-1-1,-18 36 1,17 35 0,19 35-1,17-35 1,0-36-16,17 19 16,36 17-1,18-36 1,-1-34-1,-17-19 17,18-17-32</inkml:trace>
+  <inkml:trace contextRef="#ctx0" brushRef="#br0" timeOffset="179190.79">7814 12806 0,'0'-18'16,"18"18"-16,-18-17 15,17 17 16,-17 17 1,18-17-32,0 53 15,-1-18 1,18 36 0,-17 17-1,0-17 1,17-36-1,0 0 1,1-35 15,34-17-15,-17-1 0,-35 0-16,52-17 15,-17 17 1,0 1-1,-35-1 1</inkml:trace>
+  <inkml:trace contextRef="#ctx0" brushRef="#br0" timeOffset="180541.32">8802 12700 0,'0'0'0,"0"-18"16,-18 1-1,1-1 1,-19 18-1,-17 0 1,18 0-16,0 35 16,-53 18-1,52 18 1,1 52 0,35 18-1,35 1 1,18-72 15,-35-52-31,52 35 16,54-18-1,-1-35 1,36-35 0,-71-18-1,18-71 1,-35-17-1,-54-18 1,-70 18 0,0 53-1,-70 18 1,-18 34 0,17 36-1,54 36 1,17 34 15,53-35-31</inkml:trace>
+  <inkml:trace contextRef="#ctx0" brushRef="#br0" timeOffset="183042.39">8855 12929 0,'-18'-17'16,"18"-1"15,0 0-31,18 1 15,-36 17 32,0 0-47,-34 17 16,16-17 0,1 18-1,0 17 1,35 1 15,17-19-15,19 1-1,17-1 1,-18-17 0,0 0-16,0 0 15,18 0 1,-35 18-1,-18 0 1,-18-1 0,-35 19-1,-17-1 1,-1-17 0,36-18 15,0 0-16,17-18 1,0 18-16</inkml:trace>
+  <inkml:trace contextRef="#ctx0" brushRef="#br0" timeOffset="183808.54">8961 13335 0,'17'0'31,"1"0"-16,-1 0 1,-17 18 0,18 17-1,0 18 1,-1 0 0,-17-36-16,18 19 15,0-19 1,-1 19-1,19-36 1,-1 0 0,0-18-1,18 0 1,18-17 0,-18 17 15,-18 1-16,-18 17 1</inkml:trace>
+  <inkml:trace contextRef="#ctx0" brushRef="#br0" timeOffset="184458.62">9578 13141 0,'0'0'0,"0"-18"16,-35 36 0,17-18-1,-17 35 1,-1 18 0,1 0-1,18 0 1,17 35-1,35 0 1,18 1 0,0-37-1,0-34 1,17 0 0,18-36-1,0-35 1,-35 0 15,18-70-15,-36-18-1,-35 0 1,-17 35 0,-19 53-1,-17 18 1,-17 17-1,-1 18 1,36 18 0,17-1-16,1 1 15,-1-1-15</inkml:trace>
+  <inkml:trace contextRef="#ctx0" brushRef="#br0" timeOffset="184809.5">9701 13229 0,'0'0'0,"-17"0"16,17-17 0,-36 34-1,1 18 1,18 1 0,17 17 15,17-18-31,36-17 31,18-18-15,-36-18-16</inkml:trace>
+  <inkml:trace contextRef="#ctx0" brushRef="#br0" timeOffset="187160.06">6914 14640 0,'-17'-17'31,"-1"17"-31,18 17 31,0 1-15,18 17 0,-1 0-1,-17 18 1,0-35 0,0 0-1,0 17 1,0-53 46,0 1-46,0-19-16,0-17 16,0 18-1,0-35 1,0-36-1,36 35 1,17 71 0,-18 36-1,0 16 1,18 37 0,-18-19-1,1-17 1,-36-35-1,0-1-15</inkml:trace>
+  <inkml:trace contextRef="#ctx0" brushRef="#br0" timeOffset="187360.68">6950 14693 0,'-18'-17'31,"36"17"-31,-1 0 16,36-18-1,-35 0-15,0 1 16,34-1 0,-52 0-16</inkml:trace>
+  <inkml:trace contextRef="#ctx0" brushRef="#br0" timeOffset="187827.32">7161 14534 0,'0'-17'0,"0"34"0,0-52 16,18 18 0,0 34 15,-18 1-15,17-1-16,19 36 31,-1 18-16,-18-36 1,-17-17-16,0-1 16,18 1-1,-18 0 1,0-36 0,-35-52-1,0-19 1,-18-34-1,53 35 1,0 52 0,35 36-1,18 18 1,0 17 15,-36-17-15,1 17-1,-36 1 1,-17-1 0,-18 0-1,36-35 1</inkml:trace>
+  <inkml:trace contextRef="#ctx0" brushRef="#br0" timeOffset="188412.84">7444 14358 0,'0'0'0,"0"-18"16,17 18-1,1-17 1,17-1 0,-17 18-16,17-18 15,0 18 1,-17 0 0,-18-17 15,0 34 16,0 1-47,18 17 15,-18 18 1,17 18 0,1-18 15,0-18-16,-18-17-15,0-1 16,17 1 0,-34-18 15,-1-18-15,0 1-1,-35-1 1,18 18-1,0 18 1</inkml:trace>
+  <inkml:trace contextRef="#ctx0" brushRef="#br0" timeOffset="189197.76">7373 14975 0,'-18'0'0,"36"0"0,-36-17 0,-17 17 31,35 17 16,18 1-31,-18 0-1,0-1-15,17-17 0,-17 53 16,18 0 0,0 0 15,-1-35-16,-17-1 1,18 1 0,17-18-1,18-18 1,35 1 0,-17-19-1,35 1 1,-18 0-1,-53 17 1</inkml:trace>
+  <inkml:trace contextRef="#ctx0" brushRef="#br0" timeOffset="189710.45">8043 14922 0,'-17'0'15,"17"-17"-15,0 34 32,0 1-17,17 17 1,-17-17-16,18 17 15,0 36 1,-1-36 0,1-17-1</inkml:trace>
+  <inkml:trace contextRef="#ctx0" brushRef="#br0" timeOffset="189978.14">8114 14905 0,'18'17'15,"-1"1"1,1 17-1,-1 1 1,1-19-16,0 19 16,-18-1-1,17 0 1</inkml:trace>
+  <inkml:trace contextRef="#ctx0" brushRef="#br0" timeOffset="190311.01">8149 14922 0,'18'0'32,"-18"18"-32,17-18 0,1 18 15,35 17 1,-18 0-1,-17-35-15,17 18 16,0 0 0,-17-18-1,0-53 1,-1 17 0,-34-34 15,-1-1-16,0 36 1,18 53 0</inkml:trace>
+  <inkml:trace contextRef="#ctx0" brushRef="#br0" timeOffset="191545">7408 15293 0,'-17'0'0,"17"-18"15,0 1 1,0 34 31,0 1-32,35 35 1,-17 0 0,-1-18-16,19 36 15,34 70 1,-17 35 0,18-17-1,-36-53 1,-18-71-16,1 71 15,35 17 1,-18 18 0,-17-17-1,0-36 1,17 18 15,-18 0-15,1-18-1,0-35 1,-1-18 0,-17 0-1,18-17 1,-18 0 0,18-18 15,-1 0-16,36-18 1,-17 18 0,-19-18-16,54 1 15,-1-1 1,18-17 15,-35 17-15,-35 18-1,-36 18 1</inkml:trace>
+  <inkml:trace contextRef="#ctx0" brushRef="#br0" timeOffset="192265.14">8819 16933 0,'0'-17'16,"0"-1"-1,0 0-15,0 1 16,-17 17 15,-1 17-15,1 1-1,-1 53 1,0 17 0,36-35-1,0-36 1,34 19 0,1-36-1,0 0 1,-35 0-16</inkml:trace>
+  <inkml:trace contextRef="#ctx0" brushRef="#br0" timeOffset="192878.96">8908 16810 0,'0'17'31,"0"1"-31,0 0 16,17 17-1,1 18 1,0 18 15,-18-54-15,17 18-1,-17-52 17,0-18-17,0 17-15,0-35 16,-17-35 0,-1 35-1,18 18 1,35 52 15,0 18-15,18 1-1,-17-1 17,-19-17-32,36-1 15,-35 1 1,17-18-1,-17-35 1,-18-1 0,-36-52-1,-16 0 1,-1 35 0,35 35-1</inkml:trace>
+  <inkml:trace contextRef="#ctx0" brushRef="#br0" timeOffset="193872.06">8326 15346 0,'0'0'0,"0"-18"16,0 1 0,17 17-1,-17-18-15,0 36 47,0-1-31,18 1-16,-18-1 15,17 36 1,1-17 0,0-1 15,-1-17-15,1-1-1,0-17 1,17 0-1,18-17 1,-36 17-16,19-18 16,-1 0-1</inkml:trace>
+  <inkml:trace contextRef="#ctx0" brushRef="#br0" timeOffset="194797.33">8767 15328 0,'-18'-17'0,"0"-1"31,18 36 0,0-1-31,0 1 16,0-1 0,0 19-16,18-1 15,0 0 1,-18-17 0,17 0-1,-17-36 16,0 0-15,0-17 0,0 0-1,0 17 1,0-35 0,0-17-1,35 17 1,-17 35-1,0 36 1,35 35 0,-18-18-1,0 18 1,-17-36 0,-1 1-1,-17 0 1,0-36-1,0 0 1,0-17 0,-17-35-1,-1 17 17,36 17-17,35 72 1,0-1-1,35 36 1,-35 17 0</inkml:trace>
+  <inkml:trace contextRef="#ctx0" brushRef="#br0" timeOffset="197514.76">8449 15469 0,'0'18'16,"18"17"15,-1 0-31,1 18 16,0 18-1,17 35 1,18 53 0,-18-89-1,0 1 1,1 17-1,-1-18 1,-17-34 0,-1-1-1,1-17 1,-1-1 0,19 1-1,-19-18 1,19-18-1,34-17 17,-35 35-17,1-18 1,-19 1 0,1 17-1</inkml:trace>
+  <inkml:trace contextRef="#ctx0" brushRef="#br0" timeOffset="198847.79">9225 16051 0,'0'0'0,"-18"0"0,18 18 62,18 0-62,-18-1 0,18 1 16,17 17 0,0 18-1,-17-18 1,0-17 0,-18 0-16,17-18 15,-34-18 16,-1 0-15,0 1-16,-17-36 16,0-35-1,-1-1 1,19 37 0,17-19-1,53 53 1,0 18-1,0 36 17,-18-19-17,-35 36 1,-18 0 0,-17 0-1,0-35 1,17-1-1,18 1 1,35-18 0,18 35-1,0-17 1,35 35 0</inkml:trace>
+  <inkml:trace contextRef="#ctx0" brushRef="#br0" timeOffset="200099.03">9119 17127 0,'18'0'47,"-18"18"-47,18 0 15,-18-1 1,17 1-16,1 35 16,-1 17-1,1 1 1,0-18-1,-18-18 17,17-17-17,1-18 17,0-18-17,17 0 1,0 1-16,18-1 15,0-17 1,18 17 0,-18 1-1,-36 17 1,1 0 0</inkml:trace>
+  <inkml:trace contextRef="#ctx0" brushRef="#br0" timeOffset="201715.79">9719 17216 0,'0'0'0,"0"17"62,18-17-62,-18 18 16,0-1 15,17-17-31,-17 18 266,36 17-250,-19-17-1,-17 0-15,18-1 16,-18 1-1,17 0 1,-17-1 15,0-34 1,-17-1-17,-1-17 1,18 17-16,-17-17 15,-19-36 1,19-17 0,17 35-1,0 0 1,35 36 0,0 17-1,0 0 1,-17 17-1,0 1 17,-1 17-17,-17 0 1,-17-17 0,-1 17-1,0-17 1,36-18 15,17 0-15,-17 0-1,53 18 1,-18-1 0,-36 18-1,1-35-15,-18 36 16,-35-1-1,-18-17 1,0-18 15,0 17-15,35-34-16</inkml:trace>
+  <inkml:trace contextRef="#ctx0" brushRef="#br0" timeOffset="203041.34">9349 17515 0,'17'0'0,"-17"18"47,0 0-31,18 17-1,17 36 1,-17-36 0,17 53-1,0 0 1,18 18-1,-35-35 17,17 34-17,-17-69-15,-1 34 16,1 36 0,17-35-1,-17-54 1,0 19-1,-18-54 17,17 0-17,-17-17 1,18 35 0,17-18-1,-17 1 1,-1 17-16,19-18 15,34 0 17,19 1-17,-1-1 1,-35 1 0,-18 17-1,-17 0 1,-36 0 15</inkml:trace>
+  <inkml:trace contextRef="#ctx0" brushRef="#br0" timeOffset="204967.26">10460 18080 0,'0'-18'16,"0"1"-1,0-1 16,0 0-31,0 1 16,-18 17 0,1-18-1,-19 18 1,19 0-16,-1 0 16,-35 53-1,35-18 1,18 18-1,36-35 1,34 17 0,-17-35-1,35 0 1,-35 0 0,-17 0 15,-19 18-16,-52 17 1,0 0 0,-36-17-1,18-18 1</inkml:trace>
+  <inkml:trace contextRef="#ctx0" brushRef="#br0" timeOffset="207875.62">9102 15452 0,'-18'-18'0,"18"0"31,0 36 1,0 0-17,18-1-15,-18 1 31,17 17-15,-17-17 0,18-1-16,-18 1 15,18 0 17,17-18-17,-35-18-15,35 0 16,36 1-1,-1-18 1,-34 17 0,16 0-1,-34 18 1</inkml:trace>
+  <inkml:trace contextRef="#ctx0" brushRef="#br0" timeOffset="208620.75">9525 15328 0,'0'0'0,"0"-17"0,0 34 46,18 1-30,-1 17 0,-17-17-1,18-1-15,-18 1 16,18 17 0,-18-52 30,0-1-30,0-17 0,0-18-1,0-18 17,0 54-32,35-1 15,0 18 16,0 35-15,-17-17 0,0 0-1,-18-1 1,17-17 0,1-17 15,-18-1-16,18-17 1,-18-1 0,17 36-16,1-17 15,17 34 1,0 1 0,1 35 15</inkml:trace>
+  <inkml:trace contextRef="#ctx0" brushRef="#br0" timeOffset="209135.01">9155 15557 0,'0'0'0,"0"-17"16,17 17 0,1 0-1,17 35 1,0 18 0,1-18-1,-19 1 1,19-36-1,-1 17 1,53-52 0,-35 17-1,-35 1-15,52-19 16,-17 1 0,-35 35-1</inkml:trace>
+  <inkml:trace contextRef="#ctx0" brushRef="#br0" timeOffset="209684.7">9684 15557 0,'17'18'15,"-17"0"1,18-18-16,0 53 16,17-18-1,-35-17 1,18-1-1,17 19 1,-35-19 15,0-34-15,0-1-16,-18 0 16,-17-52-1,0-1 1,17 18-1,18 0 1,35 18 0,1 35-1,16 18 1,-34-1 0,17 1 15,-35 17-16,-35 0 1,-18 1 0,18-19-16</inkml:trace>
+  <inkml:trace contextRef="#ctx0" brushRef="#br0" timeOffset="210560.69">9331 15822 0,'18'0'0,"-1"0"32,1 18-1,0-1-16,-1 1 1,1 0-16,-1-1 16,19 19-1,-19 16 1,1-34 0,-18 0-1,18-1 1,-1 1-1,1 0 1,0-18 0,17 0-1,18-18 1,17-17 0,1-1-1,-54 19 1,1 17-1,-18 17 32</inkml:trace>
+  <inkml:trace contextRef="#ctx0" brushRef="#br0" timeOffset="211537.05">9543 15699 0,'-18'0'16,"18"17"46,18 1-46,-18 0 0,17 17-1,-17-18 1,18 19 0,-18-1-1,0-17 1,18-1-1,-18 1 1</inkml:trace>
+  <inkml:trace contextRef="#ctx0" brushRef="#br0" timeOffset="212372.16">10001 15946 0,'0'0'0,"0"-18"0,18 36 47,-18-1-47,18-17 16,-1 53-1,1 0 1,-1-35-1,-17-1 1,0-34 15,0-1-31,-17 0 16,17 1 0,-18-19-1,-17-52 1,0 18-1,35 17 1,17 18 0,1 35-1,35 0 1,-36 35 0,-17 0-1,0 0 1,-35 1-1,18-1 1,34-17 0,18-1-1,71 18 1,-18 1 0,-52-19-1</inkml:trace>
+  <inkml:trace contextRef="#ctx0" brushRef="#br0" timeOffset="213273.09">9525 16369 0,'18'0'47,"-18"18"-31,17-1-1,1 18 1,0-17-16,-1 17 31,18 1-15,-17-36-1,17 0 1,18-18 0,-35 18-16,17-35 15,36-1 1,-18 19 0,-36-1-1,1 1 1,0 17-1</inkml:trace>
+  <inkml:trace contextRef="#ctx0" brushRef="#br0" timeOffset="213888.7">10037 16263 0,'0'0'0,"-18"0"15,36 0 1,-1 0-1,18-18-15,1 18 16,52-17 0,-35-1-1,-18 0 17,-53 18-1,1 18-16,-1 0 1,1-18 0,-1 17-1,18 1 1,18 17 0,17 1-1,-18-1 1,1-17-1,-36-18 32,1 0-15,-1 0-32,1 0 15,-54 0 1,0 35-1</inkml:trace>
+  <inkml:trace contextRef="#ctx0" brushRef="#br0" timeOffset="214436.73">9701 16492 0,'-17'0'16,"17"18"0,35 17-1,-17-17 1,17 17-1,0 0 1,-17-17 0,17-18-1,0 0 1,-17 0 15,53-18-15,-54 1-16,36-1 15,18-17 1,-18 17 0,-18 1-16</inkml:trace>
+  <inkml:trace contextRef="#ctx0" brushRef="#br0" timeOffset="214720.78">10231 16475 0,'0'0'0,"0"17"0,17-17 31,1 18-15,17 17-1,0 1 1,1-19 0,-19 18-1,1 1 1</inkml:trace>
+  <inkml:trace contextRef="#ctx0" brushRef="#br0" timeOffset="-214442.74">10425 16492 0,'0'0'16,"17"0"-16,-17 18 31,0 0-15,0-1-1,-17-17-15,17 18 16,-18 0 0,0-1-1,36-17 17,17 0-17,36 0 1,-1 0-1,-34 18 1,17-18 0</inkml:trace>
+  <inkml:trace contextRef="#ctx0" brushRef="#br0" timeOffset="-213873.38">9878 16651 0,'0'0'0,"35"18"31,-17-18-31,-1 17 16,19 1-1,17 35 1,-1 17-1,-16-17 1,-19-35 0,19 17-1,-19-17 1,1-18 0,-18-18-1,35 1 1,18-19-1,35 1 1,-35 17 0,-18 18-16,18-17 15,-17 17 17,-36-18-17</inkml:trace>
+  <inkml:trace contextRef="#ctx0" brushRef="#br0" timeOffset="-213468.48">10707 16739 0,'17'0'0,"-34"0"0,34-17 15,1 17 1,-18-18-16,-18 18 31,1 0-15,-1 18 0,1-1-1,-1 1 1,18 0-16,0-1 15,18-17 1,17 18 0,-18-1-1,36 1 1,-35 0 0,-18 17-1,-35 0 1,-18-35-1</inkml:trace>
+  <inkml:trace contextRef="#ctx0" brushRef="#br0" timeOffset="-210872.92">10054 17498 0,'0'17'109,"18"1"-93,-1 0-1,1-1 1,0 1 0,-1-18-1,19 0 1,34-18-1,36-17 17,-71 17-32,36 1 0,17-19 31,-53 19-15</inkml:trace>
+  <inkml:trace contextRef="#ctx0" brushRef="#br0" timeOffset="-210357.47">10089 17568 0,'-17'-17'15,"34"17"16,1 17 1,0-17-32,17 36 15,0-19 1,-17 19 0,17-19-1,0 1 1,1-18-1,-1 0 1,-17 0 0,35-18-1,35-17 1,-35 0 0,-36 17-1,1 18 1</inkml:trace>
+  <inkml:trace contextRef="#ctx0" brushRef="#br0" timeOffset="-209970.79">10195 17674 0,'0'-17'0,"18"17"31,17 0-15,-35 17-1,53 18 1,0 18-1,-18-35 1,1 0 0,-1-1-1,18-34 1,35-19 0,18 1-1,-53 17 1,0 1-1</inkml:trace>
+  <inkml:trace contextRef="#ctx0" brushRef="#br0" timeOffset="-208839.68">10742 18344 0,'0'18'0,"0"0"31,0-1 1,18 1-1,-1 17-31,19 1 15,-19-19 1,1-17 0,35 0-1,17-35 1,19 0 0,-1-18-1,-53 17 1,0 1-1,-35 18-15</inkml:trace>
+  <inkml:trace contextRef="#ctx0" brushRef="#br0" timeOffset="-208422.86">10813 18450 0,'17'18'31,"1"-18"-15,0 18-1,17-18 1,-18 35 0,1-18-1,0 1-15,-1 0 16,19 17 0,17-17-1,-18-18 1,35-36-1,1-17 17,-18 1-17,-53 34-15</inkml:trace>
+  <inkml:trace contextRef="#ctx0" brushRef="#br0" timeOffset="-207939.58">10989 18521 0,'18'53'15,"-1"-36"-15,-17 1 16,36 53 0,-1-71-1,-18 0-15,54 0 16,-36 0 0,36 0-1,-18 0 1,0-18-1,35-17 1,-18-18 0</inkml:trace>
+  <inkml:trace contextRef="#ctx0" brushRef="#br0" timeOffset="-204602.31">8008 14252 0,'-18'-35'15,"1"35"1,17-18-16,-18 18 16,18 18 15,0 0-31,18-1 16,-1 36-1,1-18 16,-18-17-15,18-18 0,-1-35-1,1-36 1,17 18 0,1-35-1,34 18 1,-17 34-1</inkml:trace>
+  <inkml:trace contextRef="#ctx0" brushRef="#br0" timeOffset="-204038.83">8678 14852 0,'0'0'16,"0"-18"-16,18 1 15,0 17 16,-1 17-15,1 19 0,0-1-1,17-18 1,-18 1 0,1-18-1,0-35 1,-1 0-1,36-54 1,-17 1 0,-1 35-1,-18 36-15</inkml:trace>
+  <inkml:trace contextRef="#ctx0" brushRef="#br0" timeOffset="-203570.9">9437 14993 0,'17'18'31,"-17"-1"-31,18 1 32,-18-36-1,18 18-15,-1-35-1,36-18 1,-17 0-1,-1 36-15,18-36 16,35-18 0</inkml:trace>
+</inkml:ink>
+</file>
+
+<file path=ppt/ink/ink3.xml><?xml version="1.0" encoding="utf-8"?>
+<inkml:ink xmlns:inkml="http://www.w3.org/2003/InkML">
+  <inkml:definitions>
+    <inkml:context xml:id="ctx0">
+      <inkml:inkSource xml:id="inkSrc0">
+        <inkml:traceFormat>
+          <inkml:channel name="X" type="integer" max="1920" units="cm"/>
+          <inkml:channel name="Y" type="integer" max="1080" units="cm"/>
+          <inkml:channel name="T" type="integer" max="2.14748E9" units="dev"/>
+        </inkml:traceFormat>
+        <inkml:channelProperties>
+          <inkml:channelProperty channel="X" name="resolution" value="55.81395" units="1/cm"/>
+          <inkml:channelProperty channel="Y" name="resolution" value="55.6701" units="1/cm"/>
+          <inkml:channelProperty channel="T" name="resolution" value="1" units="1/dev"/>
+        </inkml:channelProperties>
+      </inkml:inkSource>
       <inkml:timestamp xml:id="ts0" timeString="2022-03-14T07:47:48.113"/>
     </inkml:context>
     <inkml:brush xml:id="br0">
@@ -2892,11 +3092,11 @@
     </inkml:brush>
   </inkml:definitions>
   <inkml:trace contextRef="#ctx0" brushRef="#br0">16210 16475 0,'53'0'94,"-35"0"-94,70 0 15,124 0 1,176 0 15,-230 0-15,142 0-16,18 53 16,-18-36-1,-53-17 1,17 0-1,1 0 1,35 0 15,-142 0-15,-105 0 0,0 0-1,0-17 1</inkml:trace>
-  <inkml:trace contextRef="#ctx0" brushRef="#br0" timeOffset="1118.935">22296 15575 0,'17'-18'78,"1"18"-78,105 0 16,1 0 0,105 0-16,106-52 31,-35 16-15,-194 1-1</inkml:trace>
+  <inkml:trace contextRef="#ctx0" brushRef="#br0" timeOffset="1118.93">22296 15575 0,'17'-18'78,"1"18"-78,105 0 16,1 0 0,105 0-16,106-52 31,-35 16-15,-194 1-1</inkml:trace>
 </inkml:ink>
 </file>
 
-<file path=ppt/ink/ink2.xml><?xml version="1.0" encoding="utf-8"?>
+<file path=ppt/ink/ink4.xml><?xml version="1.0" encoding="utf-8"?>
 <inkml:ink xmlns:inkml="http://www.w3.org/2003/InkML">
   <inkml:definitions>
     <inkml:context xml:id="ctx0">
@@ -2921,14 +3121,14 @@
     </inkml:brush>
   </inkml:definitions>
   <inkml:trace contextRef="#ctx0" brushRef="#br0">3193 10248 0,'35'0'16,"0"0"-1,18 0-15,123 0 16,160 0-1,16 0 1,1 0 15,35 0-15,124 71 0,-124-18-1,-300-53 1,71-89 15,-89-52-15,-52 53-1,-18-35 1,18-1 0,-18 18-1,0 18 1,0-88-1,-71 17 1,-88 0 0,1 36 15,52 88-15,-53-71-1,-159 0 1,107 35-16,-530-70 31,300 106-15,282 35-16,-17 0 15,-318 0 1,388 18 0,-88 158-1,53 124 1,88-89 15,18-34-31,35 52 47,0-141-47,0 212 31,176-106-15,-52-88-16,-54-71 15,36 36 1,70 17 0,-34-35-1,334 0 32,-265-53-31,195 0-16,212-71 47,-548 36-47,-17-18 15,-35 0 1,-18 36 0,0-19 46</inkml:trace>
-  <inkml:trace contextRef="#ctx0" brushRef="#br0" timeOffset="916.348">6615 8237 0,'0'0'0,"0"-158"15,0-19-15,52 18 16,1-17-16,141-124 31,159-70-15,88 140-1,-264 160-15,70 35 16,564-159 0,-405 141-1,-71-35 1,-212 70 0,389-35-1,87 53 16,-369 35-15,281 159 0,265 159 15,-617-282-31,53-1 16,123 124-1,-106-17 1,159 193-1,-158 18 17,-107-106-17,-70-176 1,18 0-16,34 176 31,-34-123-15,-36-71-1,18-17 1,-35-36 15,-18-17 32</inkml:trace>
-  <inkml:trace contextRef="#ctx0" brushRef="#br0" timeOffset="1569.084">14005 9013 0,'0'-17'16,"53"17"62,0 0-63,18 35-15,70 18 32,-88-53-32,17 35 15,-17-17 1,-35-18-1,-1 0 1,72-18 15,-1-123-15,71-88 0,-142 123-1,54-106 16,-54 195-15</inkml:trace>
-  <inkml:trace contextRef="#ctx0" brushRef="#br0" timeOffset="6168.569">13494 12100 0,'17'0'47,"1"0"-47,53 0 15,34 0 1,142 0-1,141 0 17,-176 18-17,-88 0 1,-36-18 15,-71 0-31,1 0 16,0 0-1,17 0 17</inkml:trace>
-  <inkml:trace contextRef="#ctx0" brushRef="#br0" timeOffset="6864.549">15928 11977 0,'53'0'78,"0"0"-78,53 17 0,-18 1 15,88 17 1,-105-35 0,-54 0-1</inkml:trace>
-  <inkml:trace contextRef="#ctx0" brushRef="#br0" timeOffset="7421.684">17551 12083 0,'17'0'47,"1"0"-31,35 0-1,-18 0 1,36 0-16,87 0 16,-87 0-1,-36 0 1</inkml:trace>
-  <inkml:trace contextRef="#ctx0" brushRef="#br0" timeOffset="10596.949">14711 10566 0,'0'0'16,"17"-53"-1,1 0 1,-18 35-16,18-35 16,52-123-1,18-71 1,283-423 31,17-36-32,-229 459-15,317-353 16,-17 18 0,70 18-1,35 88 1,-70 105 0,0 71-1,264-52 16,-299 246-15,-36-18 0,-105 124-1,17 0 1,35 71 0,54 105-1,-36-17 1,0 53-1,53 140 17,-212-158-17,-105-88 1,387 194 0,-370-212-1,124 71 1,-124-53-1,-53-35 1,-17 34 0,87 72-1,-69-89 17,-54-18-32,35 1 15,-52-36 1,17 71-1,71 71 1,-70-125 0,158 231-1,-106-177 1,-18 52 15,-17-70-15,-18 1-1,54 34 17,-36-70-17,-53-18 1,0-17-16,17 35 16,-17-18-1,53 36 1,-35-36 15,17 71-15,-17-71-16,-18-17 31,0 17-15,0-17 15,17-1-16</inkml:trace>
-  <inkml:trace contextRef="#ctx0" brushRef="#br0" timeOffset="11403.705">25506 8978 0,'35'0'47,"18"53"-47,-18 0 31,-17-35-31,0-1 16,34 19 0,-16-19-16,17 18 15,35 18 1,-53-53 0,71 53 15,-71-53-16,18 0 1,-18-17 15,-35-19-15,36-52 0,17-18-1,17-17 1,1-36-1,-71 124-15,35-36 16,0 36 0,-17 0-1,17 17 17</inkml:trace>
-  <inkml:trace contextRef="#ctx0" brushRef="#br0" timeOffset="28939.312">3792 15663 0,'53'0'0,"-106"0"16,124 0-16,-1 18 16,72-18-1,157 0 1,1 35 15,35-35-15,-123 0-1,53 0 1,176 0 15,-53 0-15,-177-17-1,-87 17 1,-89 0 0,-17 0 46,35-18-62,-36-17 31,-17-1 1,0 19-32,-35-1 15,-53-105 1,70 34 0,18-87-1,0 17 1,0 36-1,71-89 17,-18 18-32,-53 35 31,0 1-15,0 105 15,0 35 0,-18 0-15,0 18 15,-17 0-15,-18 0-16,-17 0 15,-213 0 1,-634 0-1,370 0 1,248 0 0,140 0-1,124 18 17,-71 17-17,-71 18 1,-193-35-1,-195-18 17,495 0-32,-1 0 15,54 0 1,-1 0 15,18 53 16,0-36-47,35 178 31,-35-143-15,18 19-16,-18 88 16,18-1-1,35 19 1,-36-54-1,-17 195 1,0-230 0,35 0 15,-17-70-15,0 17-1,-1-17 1,1-18 15,35 35-31,-35-35 16,87 35-1,-16-17-15,34 17 32,-52-17-32,334 52 31,-105-70-16,141 0 17,-282 0-17,-89-17 1,-52 17-16,0 0 172,-18-18-157</inkml:trace>
+  <inkml:trace contextRef="#ctx0" brushRef="#br0" timeOffset="916.34">6615 8237 0,'0'0'0,"0"-158"15,0-19-15,52 18 16,1-17-16,141-124 31,159-70-15,88 140-1,-264 160-15,70 35 16,564-159 0,-405 141-1,-71-35 1,-212 70 0,389-35-1,87 53 16,-369 35-15,281 159 0,265 159 15,-617-282-31,53-1 16,123 124-1,-106-17 1,159 193-1,-158 18 17,-107-106-17,-70-176 1,18 0-16,34 176 31,-34-123-15,-36-71-1,18-17 1,-35-36 15,-18-17 32</inkml:trace>
+  <inkml:trace contextRef="#ctx0" brushRef="#br0" timeOffset="1569.08">14005 9013 0,'0'-17'16,"53"17"62,0 0-63,18 35-15,70 18 32,-88-53-32,17 35 15,-17-17 1,-35-18-1,-1 0 1,72-18 15,-1-123-15,71-88 0,-142 123-1,54-106 16,-54 195-15</inkml:trace>
+  <inkml:trace contextRef="#ctx0" brushRef="#br0" timeOffset="6168.56">13494 12100 0,'17'0'47,"1"0"-47,53 0 15,34 0 1,142 0-1,141 0 17,-176 18-17,-88 0 1,-36-18 15,-71 0-31,1 0 16,0 0-1,17 0 17</inkml:trace>
+  <inkml:trace contextRef="#ctx0" brushRef="#br0" timeOffset="6864.54">15928 11977 0,'53'0'78,"0"0"-78,53 17 0,-18 1 15,88 17 1,-105-35 0,-54 0-1</inkml:trace>
+  <inkml:trace contextRef="#ctx0" brushRef="#br0" timeOffset="7421.68">17551 12083 0,'17'0'47,"1"0"-31,35 0-1,-18 0 1,36 0-16,87 0 16,-87 0-1,-36 0 1</inkml:trace>
+  <inkml:trace contextRef="#ctx0" brushRef="#br0" timeOffset="10596.94">14711 10566 0,'0'0'16,"17"-53"-1,1 0 1,-18 35-16,18-35 16,52-123-1,18-71 1,283-423 31,17-36-32,-229 459-15,317-353 16,-17 18 0,70 18-1,35 88 1,-70 105 0,0 71-1,264-52 16,-299 246-15,-36-18 0,-105 124-1,17 0 1,35 71 0,54 105-1,-36-17 1,0 53-1,53 140 17,-212-158-17,-105-88 1,387 194 0,-370-212-1,124 71 1,-124-53-1,-53-35 1,-17 34 0,87 72-1,-69-89 17,-54-18-32,35 1 15,-52-36 1,17 71-1,71 71 1,-70-125 0,158 231-1,-106-177 1,-18 52 15,-17-70-15,-18 1-1,54 34 17,-36-70-17,-53-18 1,0-17-16,17 35 16,-17-18-1,53 36 1,-35-36 15,17 71-15,-17-71-16,-18-17 31,0 17-15,0-17 15,17-1-16</inkml:trace>
+  <inkml:trace contextRef="#ctx0" brushRef="#br0" timeOffset="11403.7">25506 8978 0,'35'0'47,"18"53"-47,-18 0 31,-17-35-31,0-1 16,34 19 0,-16-19-16,17 18 15,35 18 1,-53-53 0,71 53 15,-71-53-16,18 0 1,-18-17 15,-35-19-15,36-52 0,17-18-1,17-17 1,1-36-1,-71 124-15,35-36 16,0 36 0,-17 0-1,17 17 17</inkml:trace>
+  <inkml:trace contextRef="#ctx0" brushRef="#br0" timeOffset="28939.31">3792 15663 0,'53'0'0,"-106"0"16,124 0-16,-1 18 16,72-18-1,157 0 1,1 35 15,35-35-15,-123 0-1,53 0 1,176 0 15,-53 0-15,-177-17-1,-87 17 1,-89 0 0,-17 0 46,35-18-62,-36-17 31,-17-1 1,0 19-32,-35-1 15,-53-105 1,70 34 0,18-87-1,0 17 1,0 36-1,71-89 17,-18 18-32,-53 35 31,0 1-15,0 105 15,0 35 0,-18 0-15,0 18 15,-17 0-15,-18 0-16,-17 0 15,-213 0 1,-634 0-1,370 0 1,248 0 0,140 0-1,124 18 17,-71 17-17,-71 18 1,-193-35-1,-195-18 17,495 0-32,-1 0 15,54 0 1,-1 0 15,18 53 16,0-36-47,35 178 31,-35-143-15,18 19-16,-18 88 16,18-1-1,35 19 1,-36-54-1,-17 195 1,0-230 0,35 0 15,-17-70-15,0 17-1,-1-17 1,1-18 15,35 35-31,-35-35 16,87 35-1,-16-17-15,34 17 32,-52-17-32,334 52 31,-105-70-16,141 0 17,-282 0-17,-89-17 1,-52 17-16,0 0 172,-18-18-157</inkml:trace>
 </inkml:ink>
 </file>
 
@@ -3014,7 +3214,7 @@
           <a:p>
             <a:fld id="{4AF2A06D-4991-4208-8C88-4E8BAD69A8B8}" type="datetimeFigureOut">
               <a:rPr lang="en-US" smtClean="0"/>
-              <a:t>3/14/2022</a:t>
+              <a:t>2/3/2023</a:t>
             </a:fld>
             <a:endParaRPr lang="en-US"/>
           </a:p>
@@ -3638,7 +3838,7 @@
           <a:p>
             <a:fld id="{E26E0DA5-0C76-4851-AA82-0B75261F9EB4}" type="datetimeFigureOut">
               <a:rPr lang="en-US" smtClean="0"/>
-              <a:t>3/14/2022</a:t>
+              <a:t>2/3/2023</a:t>
             </a:fld>
             <a:endParaRPr lang="en-US"/>
           </a:p>
@@ -3806,7 +4006,7 @@
           <a:p>
             <a:fld id="{E26E0DA5-0C76-4851-AA82-0B75261F9EB4}" type="datetimeFigureOut">
               <a:rPr lang="en-US" smtClean="0"/>
-              <a:t>3/14/2022</a:t>
+              <a:t>2/3/2023</a:t>
             </a:fld>
             <a:endParaRPr lang="en-US"/>
           </a:p>
@@ -3984,7 +4184,7 @@
           <a:p>
             <a:fld id="{E26E0DA5-0C76-4851-AA82-0B75261F9EB4}" type="datetimeFigureOut">
               <a:rPr lang="en-US" smtClean="0"/>
-              <a:t>3/14/2022</a:t>
+              <a:t>2/3/2023</a:t>
             </a:fld>
             <a:endParaRPr lang="en-US"/>
           </a:p>
@@ -4311,7 +4511,7 @@
             <a:fld id="{9578D6DB-6798-42D2-B9AD-FC6F1C72FC30}" type="datetimeFigureOut">
               <a:rPr lang="en-US" smtClean="0"/>
               <a:pPr/>
-              <a:t>3/14/2022</a:t>
+              <a:t>2/3/2023</a:t>
             </a:fld>
             <a:endParaRPr lang="en-US"/>
           </a:p>
@@ -4553,7 +4753,7 @@
             <a:fld id="{425404F2-BE9A-4460-8815-8F645183555F}" type="datetimeFigureOut">
               <a:rPr lang="en-US" smtClean="0"/>
               <a:pPr/>
-              <a:t>3/14/2022</a:t>
+              <a:t>2/3/2023</a:t>
             </a:fld>
             <a:endParaRPr lang="en-US"/>
           </a:p>
@@ -4681,7 +4881,7 @@
             <a:fld id="{425404F2-BE9A-4460-8815-8F645183555F}" type="datetimeFigureOut">
               <a:rPr lang="en-US" smtClean="0"/>
               <a:pPr/>
-              <a:t>3/14/2022</a:t>
+              <a:t>2/3/2023</a:t>
             </a:fld>
             <a:endParaRPr lang="en-US"/>
           </a:p>
@@ -4931,7 +5131,7 @@
             <a:fld id="{425404F2-BE9A-4460-8815-8F645183555F}" type="datetimeFigureOut">
               <a:rPr lang="en-US" smtClean="0"/>
               <a:pPr/>
-              <a:t>3/14/2022</a:t>
+              <a:t>2/3/2023</a:t>
             </a:fld>
             <a:endParaRPr lang="en-US"/>
           </a:p>
@@ -5101,7 +5301,7 @@
             <a:fld id="{425404F2-BE9A-4460-8815-8F645183555F}" type="datetimeFigureOut">
               <a:rPr lang="en-US" smtClean="0"/>
               <a:pPr/>
-              <a:t>3/14/2022</a:t>
+              <a:t>2/3/2023</a:t>
             </a:fld>
             <a:endParaRPr lang="en-US"/>
           </a:p>
@@ -5388,7 +5588,7 @@
             <a:fld id="{425404F2-BE9A-4460-8815-8F645183555F}" type="datetimeFigureOut">
               <a:rPr lang="en-US" smtClean="0"/>
               <a:pPr/>
-              <a:t>3/14/2022</a:t>
+              <a:t>2/3/2023</a:t>
             </a:fld>
             <a:endParaRPr lang="en-US"/>
           </a:p>
@@ -5809,7 +6009,7 @@
             <a:fld id="{425404F2-BE9A-4460-8815-8F645183555F}" type="datetimeFigureOut">
               <a:rPr lang="en-US" smtClean="0"/>
               <a:pPr/>
-              <a:t>3/14/2022</a:t>
+              <a:t>2/3/2023</a:t>
             </a:fld>
             <a:endParaRPr lang="en-US"/>
           </a:p>
@@ -5934,7 +6134,7 @@
             <a:fld id="{425404F2-BE9A-4460-8815-8F645183555F}" type="datetimeFigureOut">
               <a:rPr lang="en-US" smtClean="0"/>
               <a:pPr/>
-              <a:t>3/14/2022</a:t>
+              <a:t>2/3/2023</a:t>
             </a:fld>
             <a:endParaRPr lang="en-US"/>
           </a:p>
@@ -6160,7 +6360,7 @@
           <a:p>
             <a:fld id="{E26E0DA5-0C76-4851-AA82-0B75261F9EB4}" type="datetimeFigureOut">
               <a:rPr lang="en-US" smtClean="0"/>
-              <a:t>3/14/2022</a:t>
+              <a:t>2/3/2023</a:t>
             </a:fld>
             <a:endParaRPr lang="en-US"/>
           </a:p>
@@ -6284,7 +6484,7 @@
             <a:fld id="{425404F2-BE9A-4460-8815-8F645183555F}" type="datetimeFigureOut">
               <a:rPr lang="en-US" smtClean="0"/>
               <a:pPr/>
-              <a:t>3/14/2022</a:t>
+              <a:t>2/3/2023</a:t>
             </a:fld>
             <a:endParaRPr lang="en-US"/>
           </a:p>
@@ -6831,7 +7031,7 @@
             <a:fld id="{425404F2-BE9A-4460-8815-8F645183555F}" type="datetimeFigureOut">
               <a:rPr lang="en-US" smtClean="0"/>
               <a:pPr/>
-              <a:t>3/14/2022</a:t>
+              <a:t>2/3/2023</a:t>
             </a:fld>
             <a:endParaRPr lang="en-US"/>
           </a:p>
@@ -6979,7 +7179,7 @@
             <a:fld id="{425404F2-BE9A-4460-8815-8F645183555F}" type="datetimeFigureOut">
               <a:rPr lang="en-US" smtClean="0"/>
               <a:pPr/>
-              <a:t>3/14/2022</a:t>
+              <a:t>2/3/2023</a:t>
             </a:fld>
             <a:endParaRPr lang="en-US"/>
           </a:p>
@@ -7212,7 +7412,7 @@
             <a:fld id="{425404F2-BE9A-4460-8815-8F645183555F}" type="datetimeFigureOut">
               <a:rPr lang="en-US" smtClean="0"/>
               <a:pPr/>
-              <a:t>3/14/2022</a:t>
+              <a:t>2/3/2023</a:t>
             </a:fld>
             <a:endParaRPr lang="en-US"/>
           </a:p>
@@ -7450,7 +7650,7 @@
             <a:fld id="{425404F2-BE9A-4460-8815-8F645183555F}" type="datetimeFigureOut">
               <a:rPr lang="en-US" smtClean="0"/>
               <a:pPr/>
-              <a:t>3/14/2022</a:t>
+              <a:t>2/3/2023</a:t>
             </a:fld>
             <a:endParaRPr lang="en-US"/>
           </a:p>
@@ -7632,7 +7832,7 @@
             <a:fld id="{425404F2-BE9A-4460-8815-8F645183555F}" type="datetimeFigureOut">
               <a:rPr lang="en-US" smtClean="0"/>
               <a:pPr/>
-              <a:t>3/14/2022</a:t>
+              <a:t>2/3/2023</a:t>
             </a:fld>
             <a:endParaRPr lang="en-US"/>
           </a:p>
@@ -7909,7 +8109,7 @@
             <a:fld id="{425404F2-BE9A-4460-8815-8F645183555F}" type="datetimeFigureOut">
               <a:rPr lang="en-US" smtClean="0"/>
               <a:pPr/>
-              <a:t>3/14/2022</a:t>
+              <a:t>2/3/2023</a:t>
             </a:fld>
             <a:endParaRPr lang="en-US"/>
           </a:p>
@@ -8163,7 +8363,7 @@
             <a:fld id="{425404F2-BE9A-4460-8815-8F645183555F}" type="datetimeFigureOut">
               <a:rPr lang="en-US" smtClean="0"/>
               <a:pPr/>
-              <a:t>3/14/2022</a:t>
+              <a:t>2/3/2023</a:t>
             </a:fld>
             <a:endParaRPr lang="en-US"/>
           </a:p>
@@ -8333,7 +8533,7 @@
             <a:fld id="{425404F2-BE9A-4460-8815-8F645183555F}" type="datetimeFigureOut">
               <a:rPr lang="en-US" smtClean="0"/>
               <a:pPr/>
-              <a:t>3/14/2022</a:t>
+              <a:t>2/3/2023</a:t>
             </a:fld>
             <a:endParaRPr lang="en-US"/>
           </a:p>
@@ -8513,7 +8713,7 @@
             <a:fld id="{425404F2-BE9A-4460-8815-8F645183555F}" type="datetimeFigureOut">
               <a:rPr lang="en-US" smtClean="0"/>
               <a:pPr/>
-              <a:t>3/14/2022</a:t>
+              <a:t>2/3/2023</a:t>
             </a:fld>
             <a:endParaRPr lang="en-US"/>
           </a:p>
@@ -8759,7 +8959,7 @@
           <a:p>
             <a:fld id="{E26E0DA5-0C76-4851-AA82-0B75261F9EB4}" type="datetimeFigureOut">
               <a:rPr lang="en-US" smtClean="0"/>
-              <a:t>3/14/2022</a:t>
+              <a:t>2/3/2023</a:t>
             </a:fld>
             <a:endParaRPr lang="en-US"/>
           </a:p>
@@ -8988,7 +9188,7 @@
           <a:p>
             <a:fld id="{E26E0DA5-0C76-4851-AA82-0B75261F9EB4}" type="datetimeFigureOut">
               <a:rPr lang="en-US" smtClean="0"/>
-              <a:t>3/14/2022</a:t>
+              <a:t>2/3/2023</a:t>
             </a:fld>
             <a:endParaRPr lang="en-US"/>
           </a:p>
@@ -9352,7 +9552,7 @@
           <a:p>
             <a:fld id="{E26E0DA5-0C76-4851-AA82-0B75261F9EB4}" type="datetimeFigureOut">
               <a:rPr lang="en-US" smtClean="0"/>
-              <a:t>3/14/2022</a:t>
+              <a:t>2/3/2023</a:t>
             </a:fld>
             <a:endParaRPr lang="en-US"/>
           </a:p>
@@ -9469,7 +9669,7 @@
           <a:p>
             <a:fld id="{E26E0DA5-0C76-4851-AA82-0B75261F9EB4}" type="datetimeFigureOut">
               <a:rPr lang="en-US" smtClean="0"/>
-              <a:t>3/14/2022</a:t>
+              <a:t>2/3/2023</a:t>
             </a:fld>
             <a:endParaRPr lang="en-US"/>
           </a:p>
@@ -9564,7 +9764,7 @@
           <a:p>
             <a:fld id="{E26E0DA5-0C76-4851-AA82-0B75261F9EB4}" type="datetimeFigureOut">
               <a:rPr lang="en-US" smtClean="0"/>
-              <a:t>3/14/2022</a:t>
+              <a:t>2/3/2023</a:t>
             </a:fld>
             <a:endParaRPr lang="en-US"/>
           </a:p>
@@ -9839,7 +10039,7 @@
           <a:p>
             <a:fld id="{E26E0DA5-0C76-4851-AA82-0B75261F9EB4}" type="datetimeFigureOut">
               <a:rPr lang="en-US" smtClean="0"/>
-              <a:t>3/14/2022</a:t>
+              <a:t>2/3/2023</a:t>
             </a:fld>
             <a:endParaRPr lang="en-US"/>
           </a:p>
@@ -10091,7 +10291,7 @@
           <a:p>
             <a:fld id="{E26E0DA5-0C76-4851-AA82-0B75261F9EB4}" type="datetimeFigureOut">
               <a:rPr lang="en-US" smtClean="0"/>
-              <a:t>3/14/2022</a:t>
+              <a:t>2/3/2023</a:t>
             </a:fld>
             <a:endParaRPr lang="en-US"/>
           </a:p>
@@ -10302,7 +10502,7 @@
           <a:p>
             <a:fld id="{E26E0DA5-0C76-4851-AA82-0B75261F9EB4}" type="datetimeFigureOut">
               <a:rPr lang="en-US" smtClean="0"/>
-              <a:t>3/14/2022</a:t>
+              <a:t>2/3/2023</a:t>
             </a:fld>
             <a:endParaRPr lang="en-US"/>
           </a:p>
@@ -10859,7 +11059,7 @@
             <a:fld id="{425404F2-BE9A-4460-8815-8F645183555F}" type="datetimeFigureOut">
               <a:rPr lang="en-US" smtClean="0"/>
               <a:pPr/>
-              <a:t>3/14/2022</a:t>
+              <a:t>2/3/2023</a:t>
             </a:fld>
             <a:endParaRPr lang="en-US"/>
           </a:p>
@@ -16155,6 +16355,57 @@
           </a:p>
         </p:txBody>
       </p:sp>
+      <mc:AlternateContent xmlns:mc="http://schemas.openxmlformats.org/markup-compatibility/2006">
+        <mc:Choice xmlns:p14="http://schemas.microsoft.com/office/powerpoint/2010/main" Requires="p14">
+          <p:contentPart p14:bwMode="auto" r:id="rId3">
+            <p14:nvContentPartPr>
+              <p14:cNvPr id="2" name="Ink 1">
+                <a:extLst>
+                  <a:ext uri="{FF2B5EF4-FFF2-40B4-BE49-F238E27FC236}">
+                    <a16:creationId xmlns:a16="http://schemas.microsoft.com/office/drawing/2014/main" id="{BCA48FD7-5160-D8CC-09FE-E86EE2E58427}"/>
+                  </a:ext>
+                </a:extLst>
+              </p14:cNvPr>
+              <p14:cNvContentPartPr/>
+              <p14:nvPr/>
+            </p14:nvContentPartPr>
+            <p14:xfrm>
+              <a:off x="38160" y="812880"/>
+              <a:ext cx="9950760" cy="5239080"/>
+            </p14:xfrm>
+          </p:contentPart>
+        </mc:Choice>
+        <mc:Fallback>
+          <p:pic>
+            <p:nvPicPr>
+              <p:cNvPr id="2" name="Ink 1">
+                <a:extLst>
+                  <a:ext uri="{FF2B5EF4-FFF2-40B4-BE49-F238E27FC236}">
+                    <a16:creationId xmlns:a16="http://schemas.microsoft.com/office/drawing/2014/main" id="{BCA48FD7-5160-D8CC-09FE-E86EE2E58427}"/>
+                  </a:ext>
+                </a:extLst>
+              </p:cNvPr>
+              <p:cNvPicPr/>
+              <p:nvPr/>
+            </p:nvPicPr>
+            <p:blipFill>
+              <a:blip r:embed="rId4"/>
+              <a:stretch>
+                <a:fillRect/>
+              </a:stretch>
+            </p:blipFill>
+            <p:spPr>
+              <a:xfrm>
+                <a:off x="28800" y="803520"/>
+                <a:ext cx="9969480" cy="5257800"/>
+              </a:xfrm>
+              <a:prstGeom prst="rect">
+                <a:avLst/>
+              </a:prstGeom>
+            </p:spPr>
+          </p:pic>
+        </mc:Fallback>
+      </mc:AlternateContent>
     </p:spTree>
     <p:extLst>
       <p:ext uri="{BB962C8B-B14F-4D97-AF65-F5344CB8AC3E}">
@@ -17358,6 +17609,57 @@
           </a:p>
         </p:txBody>
       </p:sp>
+      <mc:AlternateContent xmlns:mc="http://schemas.openxmlformats.org/markup-compatibility/2006">
+        <mc:Choice xmlns:p14="http://schemas.microsoft.com/office/powerpoint/2010/main" Requires="p14">
+          <p:contentPart p14:bwMode="auto" r:id="rId3">
+            <p14:nvContentPartPr>
+              <p14:cNvPr id="3" name="Ink 2">
+                <a:extLst>
+                  <a:ext uri="{FF2B5EF4-FFF2-40B4-BE49-F238E27FC236}">
+                    <a16:creationId xmlns:a16="http://schemas.microsoft.com/office/drawing/2014/main" id="{9502F938-E974-2C3F-7B26-911D75A9797A}"/>
+                  </a:ext>
+                </a:extLst>
+              </p14:cNvPr>
+              <p14:cNvContentPartPr/>
+              <p14:nvPr/>
+            </p14:nvContentPartPr>
+            <p14:xfrm>
+              <a:off x="507960" y="654120"/>
+              <a:ext cx="10357200" cy="6071040"/>
+            </p14:xfrm>
+          </p:contentPart>
+        </mc:Choice>
+        <mc:Fallback>
+          <p:pic>
+            <p:nvPicPr>
+              <p:cNvPr id="3" name="Ink 2">
+                <a:extLst>
+                  <a:ext uri="{FF2B5EF4-FFF2-40B4-BE49-F238E27FC236}">
+                    <a16:creationId xmlns:a16="http://schemas.microsoft.com/office/drawing/2014/main" id="{9502F938-E974-2C3F-7B26-911D75A9797A}"/>
+                  </a:ext>
+                </a:extLst>
+              </p:cNvPr>
+              <p:cNvPicPr/>
+              <p:nvPr/>
+            </p:nvPicPr>
+            <p:blipFill>
+              <a:blip r:embed="rId4"/>
+              <a:stretch>
+                <a:fillRect/>
+              </a:stretch>
+            </p:blipFill>
+            <p:spPr>
+              <a:xfrm>
+                <a:off x="498600" y="644760"/>
+                <a:ext cx="10375920" cy="6089760"/>
+              </a:xfrm>
+              <a:prstGeom prst="rect">
+                <a:avLst/>
+              </a:prstGeom>
+            </p:spPr>
+          </p:pic>
+        </mc:Fallback>
+      </mc:AlternateContent>
     </p:spTree>
     <p:extLst>
       <p:ext uri="{BB962C8B-B14F-4D97-AF65-F5344CB8AC3E}">
@@ -18479,8 +18781,8 @@
           </a:p>
         </p:txBody>
       </p:sp>
-      <mc:AlternateContent xmlns:mc="http://schemas.openxmlformats.org/markup-compatibility/2006">
-        <mc:Choice xmlns:p14="http://schemas.microsoft.com/office/powerpoint/2010/main" Requires="p14">
+      <mc:AlternateContent xmlns:mc="http://schemas.openxmlformats.org/markup-compatibility/2006" xmlns:p14="http://schemas.microsoft.com/office/powerpoint/2010/main">
+        <mc:Choice Requires="p14">
           <p:contentPart p14:bwMode="auto" r:id="rId3">
             <p14:nvContentPartPr>
               <p14:cNvPr id="8" name="Ink 7">
@@ -18499,7 +18801,7 @@
             </p14:xfrm>
           </p:contentPart>
         </mc:Choice>
-        <mc:Fallback>
+        <mc:Fallback xmlns="">
           <p:pic>
             <p:nvPicPr>
               <p:cNvPr id="8" name="Ink 7">
@@ -19928,8 +20230,8 @@
           </a:fontRef>
         </p:style>
       </p:cxnSp>
-      <mc:AlternateContent xmlns:mc="http://schemas.openxmlformats.org/markup-compatibility/2006">
-        <mc:Choice xmlns:p14="http://schemas.microsoft.com/office/powerpoint/2010/main" Requires="p14">
+      <mc:AlternateContent xmlns:mc="http://schemas.openxmlformats.org/markup-compatibility/2006" xmlns:p14="http://schemas.microsoft.com/office/powerpoint/2010/main">
+        <mc:Choice Requires="p14">
           <p:contentPart p14:bwMode="auto" r:id="rId3">
             <p14:nvContentPartPr>
               <p14:cNvPr id="10" name="Ink 9">
@@ -19948,7 +20250,7 @@
             </p14:xfrm>
           </p:contentPart>
         </mc:Choice>
-        <mc:Fallback>
+        <mc:Fallback xmlns="">
           <p:pic>
             <p:nvPicPr>
               <p:cNvPr id="10" name="Ink 9">

</xml_diff>